<commit_message>
[CONC] Working on Banner
</commit_message>
<xml_diff>
--- a/presentation/banner-1.1.1.pptx
+++ b/presentation/banner-1.1.1.pptx
@@ -358,7 +358,7 @@
               <a:pPr>
                 <a:defRPr/>
               </a:pPr>
-              <a:t>‹nº›</a:t>
+              <a:t>‹#›</a:t>
             </a:fld>
             <a:endParaRPr lang="en-US"/>
           </a:p>
@@ -367,7 +367,7 @@
     </p:spTree>
     <p:extLst>
       <p:ext uri="{BB962C8B-B14F-4D97-AF65-F5344CB8AC3E}">
-        <p14:creationId xmlns:p14="http://schemas.microsoft.com/office/powerpoint/2010/main" xmlns="" val="1072203350"/>
+        <p14:creationId xmlns:p14="http://schemas.microsoft.com/office/powerpoint/2010/main" val="1072203350"/>
       </p:ext>
     </p:extLst>
   </p:cSld>
@@ -570,7 +570,7 @@
               <a:pPr>
                 <a:defRPr/>
               </a:pPr>
-              <a:t>‹nº›</a:t>
+              <a:t>‹#›</a:t>
             </a:fld>
             <a:endParaRPr lang="en-GB"/>
           </a:p>
@@ -579,7 +579,7 @@
     </p:spTree>
     <p:extLst>
       <p:ext uri="{BB962C8B-B14F-4D97-AF65-F5344CB8AC3E}">
-        <p14:creationId xmlns:p14="http://schemas.microsoft.com/office/powerpoint/2010/main" xmlns="" val="2372154417"/>
+        <p14:creationId xmlns:p14="http://schemas.microsoft.com/office/powerpoint/2010/main" val="2372154417"/>
       </p:ext>
     </p:extLst>
   </p:cSld>
@@ -766,7 +766,7 @@
               <a:pPr>
                 <a:defRPr/>
               </a:pPr>
-              <a:t>‹nº›</a:t>
+              <a:t>‹#›</a:t>
             </a:fld>
             <a:endParaRPr lang="en-GB"/>
           </a:p>
@@ -775,7 +775,7 @@
     </p:spTree>
     <p:extLst>
       <p:ext uri="{BB962C8B-B14F-4D97-AF65-F5344CB8AC3E}">
-        <p14:creationId xmlns:p14="http://schemas.microsoft.com/office/powerpoint/2010/main" xmlns="" val="190023816"/>
+        <p14:creationId xmlns:p14="http://schemas.microsoft.com/office/powerpoint/2010/main" val="190023816"/>
       </p:ext>
     </p:extLst>
   </p:cSld>
@@ -972,7 +972,7 @@
               <a:pPr>
                 <a:defRPr/>
               </a:pPr>
-              <a:t>‹nº›</a:t>
+              <a:t>‹#›</a:t>
             </a:fld>
             <a:endParaRPr lang="en-GB"/>
           </a:p>
@@ -981,7 +981,7 @@
     </p:spTree>
     <p:extLst>
       <p:ext uri="{BB962C8B-B14F-4D97-AF65-F5344CB8AC3E}">
-        <p14:creationId xmlns:p14="http://schemas.microsoft.com/office/powerpoint/2010/main" xmlns="" val="1479007073"/>
+        <p14:creationId xmlns:p14="http://schemas.microsoft.com/office/powerpoint/2010/main" val="1479007073"/>
       </p:ext>
     </p:extLst>
   </p:cSld>
@@ -1168,7 +1168,7 @@
               <a:pPr>
                 <a:defRPr/>
               </a:pPr>
-              <a:t>‹nº›</a:t>
+              <a:t>‹#›</a:t>
             </a:fld>
             <a:endParaRPr lang="en-GB"/>
           </a:p>
@@ -1177,7 +1177,7 @@
     </p:spTree>
     <p:extLst>
       <p:ext uri="{BB962C8B-B14F-4D97-AF65-F5344CB8AC3E}">
-        <p14:creationId xmlns:p14="http://schemas.microsoft.com/office/powerpoint/2010/main" xmlns="" val="61954085"/>
+        <p14:creationId xmlns:p14="http://schemas.microsoft.com/office/powerpoint/2010/main" val="61954085"/>
       </p:ext>
     </p:extLst>
   </p:cSld>
@@ -1386,7 +1386,7 @@
               <a:pPr>
                 <a:defRPr/>
               </a:pPr>
-              <a:t>‹nº›</a:t>
+              <a:t>‹#›</a:t>
             </a:fld>
             <a:endParaRPr lang="en-GB"/>
           </a:p>
@@ -1395,7 +1395,7 @@
     </p:spTree>
     <p:extLst>
       <p:ext uri="{BB962C8B-B14F-4D97-AF65-F5344CB8AC3E}">
-        <p14:creationId xmlns:p14="http://schemas.microsoft.com/office/powerpoint/2010/main" xmlns="" val="3179605967"/>
+        <p14:creationId xmlns:p14="http://schemas.microsoft.com/office/powerpoint/2010/main" val="3179605967"/>
       </p:ext>
     </p:extLst>
   </p:cSld>
@@ -1700,7 +1700,7 @@
               <a:pPr>
                 <a:defRPr/>
               </a:pPr>
-              <a:t>‹nº›</a:t>
+              <a:t>‹#›</a:t>
             </a:fld>
             <a:endParaRPr lang="en-GB"/>
           </a:p>
@@ -1709,7 +1709,7 @@
     </p:spTree>
     <p:extLst>
       <p:ext uri="{BB962C8B-B14F-4D97-AF65-F5344CB8AC3E}">
-        <p14:creationId xmlns:p14="http://schemas.microsoft.com/office/powerpoint/2010/main" xmlns="" val="4047622757"/>
+        <p14:creationId xmlns:p14="http://schemas.microsoft.com/office/powerpoint/2010/main" val="4047622757"/>
       </p:ext>
     </p:extLst>
   </p:cSld>
@@ -2153,7 +2153,7 @@
               <a:pPr>
                 <a:defRPr/>
               </a:pPr>
-              <a:t>‹nº›</a:t>
+              <a:t>‹#›</a:t>
             </a:fld>
             <a:endParaRPr lang="en-GB"/>
           </a:p>
@@ -2162,7 +2162,7 @@
     </p:spTree>
     <p:extLst>
       <p:ext uri="{BB962C8B-B14F-4D97-AF65-F5344CB8AC3E}">
-        <p14:creationId xmlns:p14="http://schemas.microsoft.com/office/powerpoint/2010/main" xmlns="" val="3934125589"/>
+        <p14:creationId xmlns:p14="http://schemas.microsoft.com/office/powerpoint/2010/main" val="3934125589"/>
       </p:ext>
     </p:extLst>
   </p:cSld>
@@ -2297,7 +2297,7 @@
               <a:pPr>
                 <a:defRPr/>
               </a:pPr>
-              <a:t>‹nº›</a:t>
+              <a:t>‹#›</a:t>
             </a:fld>
             <a:endParaRPr lang="en-GB"/>
           </a:p>
@@ -2306,7 +2306,7 @@
     </p:spTree>
     <p:extLst>
       <p:ext uri="{BB962C8B-B14F-4D97-AF65-F5344CB8AC3E}">
-        <p14:creationId xmlns:p14="http://schemas.microsoft.com/office/powerpoint/2010/main" xmlns="" val="202173028"/>
+        <p14:creationId xmlns:p14="http://schemas.microsoft.com/office/powerpoint/2010/main" val="202173028"/>
       </p:ext>
     </p:extLst>
   </p:cSld>
@@ -2418,7 +2418,7 @@
               <a:pPr>
                 <a:defRPr/>
               </a:pPr>
-              <a:t>‹nº›</a:t>
+              <a:t>‹#›</a:t>
             </a:fld>
             <a:endParaRPr lang="en-GB"/>
           </a:p>
@@ -2427,7 +2427,7 @@
     </p:spTree>
     <p:extLst>
       <p:ext uri="{BB962C8B-B14F-4D97-AF65-F5344CB8AC3E}">
-        <p14:creationId xmlns:p14="http://schemas.microsoft.com/office/powerpoint/2010/main" xmlns="" val="807254810"/>
+        <p14:creationId xmlns:p14="http://schemas.microsoft.com/office/powerpoint/2010/main" val="807254810"/>
       </p:ext>
     </p:extLst>
   </p:cSld>
@@ -2721,7 +2721,7 @@
               <a:pPr>
                 <a:defRPr/>
               </a:pPr>
-              <a:t>‹nº›</a:t>
+              <a:t>‹#›</a:t>
             </a:fld>
             <a:endParaRPr lang="en-GB"/>
           </a:p>
@@ -2730,7 +2730,7 @@
     </p:spTree>
     <p:extLst>
       <p:ext uri="{BB962C8B-B14F-4D97-AF65-F5344CB8AC3E}">
-        <p14:creationId xmlns:p14="http://schemas.microsoft.com/office/powerpoint/2010/main" xmlns="" val="950236474"/>
+        <p14:creationId xmlns:p14="http://schemas.microsoft.com/office/powerpoint/2010/main" val="950236474"/>
       </p:ext>
     </p:extLst>
   </p:cSld>
@@ -3001,7 +3001,7 @@
               <a:pPr>
                 <a:defRPr/>
               </a:pPr>
-              <a:t>‹nº›</a:t>
+              <a:t>‹#›</a:t>
             </a:fld>
             <a:endParaRPr lang="en-GB"/>
           </a:p>
@@ -3010,7 +3010,7 @@
     </p:spTree>
     <p:extLst>
       <p:ext uri="{BB962C8B-B14F-4D97-AF65-F5344CB8AC3E}">
-        <p14:creationId xmlns:p14="http://schemas.microsoft.com/office/powerpoint/2010/main" xmlns="" val="3039278202"/>
+        <p14:creationId xmlns:p14="http://schemas.microsoft.com/office/powerpoint/2010/main" val="3039278202"/>
       </p:ext>
     </p:extLst>
   </p:cSld>
@@ -3085,14 +3085,14 @@
           </a:ln>
           <a:extLst>
             <a:ext uri="{909E8E84-426E-40DD-AFC4-6F175D3DCCD1}">
-              <a14:hiddenFill xmlns:a14="http://schemas.microsoft.com/office/drawing/2010/main" xmlns="">
+              <a14:hiddenFill xmlns:a14="http://schemas.microsoft.com/office/drawing/2010/main">
                 <a:solidFill>
                   <a:srgbClr val="FFFFFF"/>
                 </a:solidFill>
               </a14:hiddenFill>
             </a:ext>
             <a:ext uri="{91240B29-F687-4F45-9708-019B960494DF}">
-              <a14:hiddenLine xmlns:a14="http://schemas.microsoft.com/office/drawing/2010/main" xmlns="" w="9525">
+              <a14:hiddenLine xmlns:a14="http://schemas.microsoft.com/office/drawing/2010/main" w="9525">
                 <a:solidFill>
                   <a:srgbClr val="000000"/>
                 </a:solidFill>
@@ -3143,14 +3143,14 @@
           </a:ln>
           <a:extLst>
             <a:ext uri="{909E8E84-426E-40DD-AFC4-6F175D3DCCD1}">
-              <a14:hiddenFill xmlns:a14="http://schemas.microsoft.com/office/drawing/2010/main" xmlns="">
+              <a14:hiddenFill xmlns:a14="http://schemas.microsoft.com/office/drawing/2010/main">
                 <a:solidFill>
                   <a:srgbClr val="FFFFFF"/>
                 </a:solidFill>
               </a14:hiddenFill>
             </a:ext>
             <a:ext uri="{91240B29-F687-4F45-9708-019B960494DF}">
-              <a14:hiddenLine xmlns:a14="http://schemas.microsoft.com/office/drawing/2010/main" xmlns="" w="9525">
+              <a14:hiddenLine xmlns:a14="http://schemas.microsoft.com/office/drawing/2010/main" w="9525">
                 <a:solidFill>
                   <a:srgbClr val="000000"/>
                 </a:solidFill>
@@ -3350,7 +3350,7 @@
               <a:pPr>
                 <a:defRPr/>
               </a:pPr>
-              <a:t>‹nº›</a:t>
+              <a:t>‹#›</a:t>
             </a:fld>
             <a:endParaRPr lang="en-GB"/>
           </a:p>
@@ -3790,8 +3790,8 @@
         </p:nvSpPr>
         <p:spPr bwMode="auto">
           <a:xfrm>
-            <a:off x="1414359" y="2214452"/>
-            <a:ext cx="29789646" cy="2303245"/>
+            <a:off x="1800424" y="2017485"/>
+            <a:ext cx="28803201" cy="2303245"/>
           </a:xfrm>
           <a:prstGeom prst="rect">
             <a:avLst/>
@@ -3802,14 +3802,14 @@
           </a:ln>
           <a:extLst>
             <a:ext uri="{909E8E84-426E-40DD-AFC4-6F175D3DCCD1}">
-              <a14:hiddenFill xmlns:a14="http://schemas.microsoft.com/office/drawing/2010/main" xmlns="">
+              <a14:hiddenFill xmlns:a14="http://schemas.microsoft.com/office/drawing/2010/main">
                 <a:solidFill>
                   <a:srgbClr val="FFFFFF"/>
                 </a:solidFill>
               </a14:hiddenFill>
             </a:ext>
             <a:ext uri="{91240B29-F687-4F45-9708-019B960494DF}">
-              <a14:hiddenLine xmlns:a14="http://schemas.microsoft.com/office/drawing/2010/main" xmlns="" w="9525">
+              <a14:hiddenLine xmlns:a14="http://schemas.microsoft.com/office/drawing/2010/main" w="9525">
                 <a:solidFill>
                   <a:srgbClr val="000000"/>
                 </a:solidFill>
@@ -3955,7 +3955,7 @@
         </p:nvSpPr>
         <p:spPr bwMode="auto">
           <a:xfrm>
-            <a:off x="1800425" y="8065146"/>
+            <a:off x="1800425" y="7945932"/>
             <a:ext cx="28803200" cy="5334844"/>
           </a:xfrm>
           <a:prstGeom prst="rect">
@@ -4134,14 +4134,14 @@
           </a:ln>
           <a:extLst>
             <a:ext uri="{909E8E84-426E-40DD-AFC4-6F175D3DCCD1}">
-              <a14:hiddenFill xmlns:a14="http://schemas.microsoft.com/office/drawing/2010/main" xmlns="">
+              <a14:hiddenFill xmlns:a14="http://schemas.microsoft.com/office/drawing/2010/main">
                 <a:solidFill>
                   <a:srgbClr val="FFFFFF"/>
                 </a:solidFill>
               </a14:hiddenFill>
             </a:ext>
             <a:ext uri="{91240B29-F687-4F45-9708-019B960494DF}">
-              <a14:hiddenLine xmlns:a14="http://schemas.microsoft.com/office/drawing/2010/main" xmlns="" w="9525">
+              <a14:hiddenLine xmlns:a14="http://schemas.microsoft.com/office/drawing/2010/main" w="9525">
                 <a:solidFill>
                   <a:srgbClr val="000000"/>
                 </a:solidFill>
@@ -4185,14 +4185,14 @@
           </a:ln>
           <a:extLst>
             <a:ext uri="{909E8E84-426E-40DD-AFC4-6F175D3DCCD1}">
-              <a14:hiddenFill xmlns:a14="http://schemas.microsoft.com/office/drawing/2010/main" xmlns="">
+              <a14:hiddenFill xmlns:a14="http://schemas.microsoft.com/office/drawing/2010/main">
                 <a:solidFill>
                   <a:srgbClr val="FFFFFF"/>
                 </a:solidFill>
               </a14:hiddenFill>
             </a:ext>
             <a:ext uri="{91240B29-F687-4F45-9708-019B960494DF}">
-              <a14:hiddenLine xmlns:a14="http://schemas.microsoft.com/office/drawing/2010/main" xmlns="" w="9525">
+              <a14:hiddenLine xmlns:a14="http://schemas.microsoft.com/office/drawing/2010/main" w="9525">
                 <a:solidFill>
                   <a:srgbClr val="000000"/>
                 </a:solidFill>
@@ -4236,14 +4236,14 @@
           </a:ln>
           <a:extLst>
             <a:ext uri="{909E8E84-426E-40DD-AFC4-6F175D3DCCD1}">
-              <a14:hiddenFill xmlns:a14="http://schemas.microsoft.com/office/drawing/2010/main" xmlns="">
+              <a14:hiddenFill xmlns:a14="http://schemas.microsoft.com/office/drawing/2010/main">
                 <a:solidFill>
                   <a:srgbClr val="FFFFFF"/>
                 </a:solidFill>
               </a14:hiddenFill>
             </a:ext>
             <a:ext uri="{91240B29-F687-4F45-9708-019B960494DF}">
-              <a14:hiddenLine xmlns:a14="http://schemas.microsoft.com/office/drawing/2010/main" xmlns="" w="9525">
+              <a14:hiddenLine xmlns:a14="http://schemas.microsoft.com/office/drawing/2010/main" w="9525">
                 <a:solidFill>
                   <a:srgbClr val="000000"/>
                 </a:solidFill>
@@ -4457,7 +4457,7 @@
           </a:ln>
           <a:extLst>
             <a:ext uri="{909E8E84-426E-40DD-AFC4-6F175D3DCCD1}">
-              <a14:hiddenFill xmlns:a14="http://schemas.microsoft.com/office/drawing/2010/main" xmlns="">
+              <a14:hiddenFill xmlns:a14="http://schemas.microsoft.com/office/drawing/2010/main">
                 <a:solidFill>
                   <a:srgbClr val="FFFFFF"/>
                 </a:solidFill>
@@ -4890,7 +4890,7 @@
         </p:nvSpPr>
         <p:spPr bwMode="auto">
           <a:xfrm>
-            <a:off x="1800425" y="13825786"/>
+            <a:off x="1800425" y="13640816"/>
             <a:ext cx="10441160" cy="6324808"/>
           </a:xfrm>
           <a:prstGeom prst="rect">
@@ -4905,7 +4905,7 @@
           </a:ln>
           <a:extLst>
             <a:ext uri="{909E8E84-426E-40DD-AFC4-6F175D3DCCD1}">
-              <a14:hiddenFill xmlns:a14="http://schemas.microsoft.com/office/drawing/2010/main" xmlns="">
+              <a14:hiddenFill xmlns:a14="http://schemas.microsoft.com/office/drawing/2010/main">
                 <a:solidFill>
                   <a:srgbClr val="FFFFFF"/>
                 </a:solidFill>
@@ -5077,7 +5077,7 @@
           </a:ln>
           <a:extLst>
             <a:ext uri="{909E8E84-426E-40DD-AFC4-6F175D3DCCD1}">
-              <a14:hiddenFill xmlns:a14="http://schemas.microsoft.com/office/drawing/2010/main" xmlns="">
+              <a14:hiddenFill xmlns:a14="http://schemas.microsoft.com/office/drawing/2010/main">
                 <a:solidFill>
                   <a:srgbClr val="FFFFFF"/>
                 </a:solidFill>
@@ -5108,7 +5108,7 @@
         </p:nvSpPr>
         <p:spPr bwMode="auto">
           <a:xfrm>
-            <a:off x="12457609" y="13825786"/>
+            <a:off x="12457609" y="13640816"/>
             <a:ext cx="18146241" cy="9618018"/>
           </a:xfrm>
           <a:prstGeom prst="rect">
@@ -5439,7 +5439,7 @@
         <p:spPr bwMode="auto">
           <a:xfrm>
             <a:off x="1872433" y="31179714"/>
-            <a:ext cx="10441160" cy="4093428"/>
+            <a:ext cx="10441160" cy="4104000"/>
           </a:xfrm>
           <a:prstGeom prst="rect">
             <a:avLst/>
@@ -5452,7 +5452,7 @@
           </a:ln>
           <a:extLst>
             <a:ext uri="{909E8E84-426E-40DD-AFC4-6F175D3DCCD1}">
-              <a14:hiddenFill xmlns:a14="http://schemas.microsoft.com/office/drawing/2010/main" xmlns="">
+              <a14:hiddenFill xmlns:a14="http://schemas.microsoft.com/office/drawing/2010/main">
                 <a:solidFill>
                   <a:srgbClr val="FFFFFF"/>
                 </a:solidFill>
@@ -5569,7 +5569,7 @@
               </a:spcAft>
             </a:pPr>
             <a:r>
-              <a:rPr lang="pt-BR" sz="4800" b="1" dirty="0" smtClean="0">
+              <a:rPr lang="pt-BR" sz="3600" b="1" dirty="0">
                 <a:latin typeface="Arial" charset="0"/>
               </a:rPr>
               <a:t>Conclusão</a:t>
@@ -5587,7 +5587,56 @@
                 <a:latin typeface="Arial" pitchFamily="34" charset="0"/>
                 <a:cs typeface="Arial" pitchFamily="34" charset="0"/>
               </a:rPr>
-              <a:t>Podemos concluir que hoje existem diversos modelos e normas referentes à qualidade de software como CMMI-DEV e ISO/IEC 25000, no entanto, há uma grande necessidade de modelos que propõe uma forma de estabelecer de forma prática, com descrições e exemplos.</a:t>
+              <a:t>Podemos concluir que hoje existem diversos modelos e normas referentes à qualidade de software como CMMI-DEV </a:t>
+            </a:r>
+            <a:r>
+              <a:rPr lang="pt-BR" sz="3200" dirty="0" smtClean="0">
+                <a:latin typeface="Arial" pitchFamily="34" charset="0"/>
+                <a:cs typeface="Arial" pitchFamily="34" charset="0"/>
+              </a:rPr>
+              <a:t>e a família </a:t>
+            </a:r>
+            <a:r>
+              <a:rPr lang="pt-BR" sz="3200" dirty="0" smtClean="0">
+                <a:latin typeface="Arial" pitchFamily="34" charset="0"/>
+                <a:cs typeface="Arial" pitchFamily="34" charset="0"/>
+              </a:rPr>
+              <a:t>ISO/IEC 25000, no entanto, há uma grande necessidade de </a:t>
+            </a:r>
+            <a:r>
+              <a:rPr lang="pt-BR" sz="3200" dirty="0" smtClean="0">
+                <a:latin typeface="Arial" pitchFamily="34" charset="0"/>
+                <a:cs typeface="Arial" pitchFamily="34" charset="0"/>
+              </a:rPr>
+              <a:t>exemplos que proponham </a:t>
+            </a:r>
+            <a:r>
+              <a:rPr lang="pt-BR" sz="3200" dirty="0" smtClean="0">
+                <a:latin typeface="Arial" pitchFamily="34" charset="0"/>
+                <a:cs typeface="Arial" pitchFamily="34" charset="0"/>
+              </a:rPr>
+              <a:t>uma </a:t>
+            </a:r>
+            <a:r>
+              <a:rPr lang="pt-BR" sz="3200" dirty="0" smtClean="0">
+                <a:latin typeface="Arial" pitchFamily="34" charset="0"/>
+                <a:cs typeface="Arial" pitchFamily="34" charset="0"/>
+              </a:rPr>
+              <a:t>abordagem prática </a:t>
+            </a:r>
+            <a:r>
+              <a:rPr lang="pt-BR" sz="3200" dirty="0">
+                <a:latin typeface="Arial" pitchFamily="34" charset="0"/>
+                <a:cs typeface="Arial" pitchFamily="34" charset="0"/>
+              </a:rPr>
+              <a:t>para estabelecer este </a:t>
+            </a:r>
+            <a:r>
+              <a:rPr lang="pt-BR" sz="3200" dirty="0" smtClean="0">
+                <a:latin typeface="Arial" pitchFamily="34" charset="0"/>
+                <a:cs typeface="Arial" pitchFamily="34" charset="0"/>
+              </a:rPr>
+              <a:t>modelos.</a:t>
             </a:r>
             <a:endParaRPr lang="pt-BR" sz="3200" dirty="0">
               <a:latin typeface="Arial" charset="0"/>
@@ -5595,1312 +5644,6 @@
           </a:p>
         </p:txBody>
       </p:sp>
-      <p:graphicFrame>
-        <p:nvGraphicFramePr>
-          <p:cNvPr id="15" name="Tabela 14"/>
-          <p:cNvGraphicFramePr>
-            <a:graphicFrameLocks noGrp="1"/>
-          </p:cNvGraphicFramePr>
-          <p:nvPr>
-            <p:extLst>
-              <p:ext uri="{D42A27DB-BD31-4B8C-83A1-F6EECF244321}">
-                <p14:modId xmlns:p14="http://schemas.microsoft.com/office/powerpoint/2010/main" xmlns="" val="3439167567"/>
-              </p:ext>
-            </p:extLst>
-          </p:nvPr>
-        </p:nvGraphicFramePr>
-        <p:xfrm>
-          <a:off x="2088457" y="21010903"/>
-          <a:ext cx="9937104" cy="9033014"/>
-        </p:xfrm>
-        <a:graphic>
-          <a:graphicData uri="http://schemas.openxmlformats.org/drawingml/2006/table">
-            <a:tbl>
-              <a:tblPr/>
-              <a:tblGrid>
-                <a:gridCol w="4968552"/>
-                <a:gridCol w="4968552"/>
-              </a:tblGrid>
-              <a:tr h="883945">
-                <a:tc gridSpan="2">
-                  <a:txBody>
-                    <a:bodyPr/>
-                    <a:lstStyle/>
-                    <a:p>
-                      <a:pPr algn="ctr">
-                        <a:spcAft>
-                          <a:spcPts val="0"/>
-                        </a:spcAft>
-                      </a:pPr>
-                      <a:r>
-                        <a:rPr lang="pt-BR" sz="2800" b="1" dirty="0" smtClean="0">
-                          <a:solidFill>
-                            <a:srgbClr val="000000"/>
-                          </a:solidFill>
-                          <a:latin typeface="Arial"/>
-                          <a:ea typeface="Times New Roman"/>
-                        </a:rPr>
-                        <a:t>Aderência </a:t>
-                      </a:r>
-                      <a:r>
-                        <a:rPr lang="pt-BR" sz="2800" b="1" dirty="0">
-                          <a:solidFill>
-                            <a:srgbClr val="000000"/>
-                          </a:solidFill>
-                          <a:latin typeface="Arial"/>
-                          <a:ea typeface="Times New Roman"/>
-                        </a:rPr>
-                        <a:t>do método proposto</a:t>
-                      </a:r>
-                      <a:endParaRPr lang="pt-BR" sz="2800" dirty="0">
-                        <a:latin typeface="Times New Roman"/>
-                        <a:ea typeface="Times New Roman"/>
-                      </a:endParaRPr>
-                    </a:p>
-                  </a:txBody>
-                  <a:tcPr marL="44450" marR="44450" marT="0" marB="0" anchor="ctr">
-                    <a:lnL>
-                      <a:noFill/>
-                    </a:lnL>
-                    <a:lnR>
-                      <a:noFill/>
-                    </a:lnR>
-                    <a:lnT w="38100" cap="flat" cmpd="sng" algn="ctr">
-                      <a:solidFill>
-                        <a:srgbClr val="000000"/>
-                      </a:solidFill>
-                      <a:prstDash val="solid"/>
-                      <a:round/>
-                      <a:headEnd type="none" w="med" len="med"/>
-                      <a:tailEnd type="none" w="med" len="med"/>
-                    </a:lnT>
-                    <a:lnB w="12700" cap="flat" cmpd="sng" algn="ctr">
-                      <a:solidFill>
-                        <a:srgbClr val="000000"/>
-                      </a:solidFill>
-                      <a:prstDash val="solid"/>
-                      <a:round/>
-                      <a:headEnd type="none" w="med" len="med"/>
-                      <a:tailEnd type="none" w="med" len="med"/>
-                    </a:lnB>
-                  </a:tcPr>
-                </a:tc>
-                <a:tc hMerge="1">
-                  <a:txBody>
-                    <a:bodyPr/>
-                    <a:lstStyle/>
-                    <a:p>
-                      <a:endParaRPr lang="pt-BR"/>
-                    </a:p>
-                  </a:txBody>
-                  <a:tcPr/>
-                </a:tc>
-              </a:tr>
-              <a:tr h="759641">
-                <a:tc>
-                  <a:txBody>
-                    <a:bodyPr/>
-                    <a:lstStyle/>
-                    <a:p>
-                      <a:pPr algn="ctr">
-                        <a:spcAft>
-                          <a:spcPts val="0"/>
-                        </a:spcAft>
-                      </a:pPr>
-                      <a:r>
-                        <a:rPr lang="pt-BR" sz="2800" b="1" dirty="0">
-                          <a:solidFill>
-                            <a:srgbClr val="000000"/>
-                          </a:solidFill>
-                          <a:latin typeface="Arial"/>
-                          <a:ea typeface="Times New Roman"/>
-                        </a:rPr>
-                        <a:t>CMMI-DEV - PPQA</a:t>
-                      </a:r>
-                      <a:endParaRPr lang="pt-BR" sz="2800" dirty="0">
-                        <a:latin typeface="Times New Roman"/>
-                        <a:ea typeface="Times New Roman"/>
-                      </a:endParaRPr>
-                    </a:p>
-                  </a:txBody>
-                  <a:tcPr marL="44450" marR="44450" marT="0" marB="0" anchor="ctr">
-                    <a:lnL>
-                      <a:noFill/>
-                    </a:lnL>
-                    <a:lnR>
-                      <a:noFill/>
-                    </a:lnR>
-                    <a:lnT w="12700" cap="flat" cmpd="sng" algn="ctr">
-                      <a:solidFill>
-                        <a:srgbClr val="000000"/>
-                      </a:solidFill>
-                      <a:prstDash val="solid"/>
-                      <a:round/>
-                      <a:headEnd type="none" w="med" len="med"/>
-                      <a:tailEnd type="none" w="med" len="med"/>
-                    </a:lnT>
-                    <a:lnB w="12700" cap="flat" cmpd="sng" algn="ctr">
-                      <a:solidFill>
-                        <a:srgbClr val="000000"/>
-                      </a:solidFill>
-                      <a:prstDash val="solid"/>
-                      <a:round/>
-                      <a:headEnd type="none" w="med" len="med"/>
-                      <a:tailEnd type="none" w="med" len="med"/>
-                    </a:lnB>
-                  </a:tcPr>
-                </a:tc>
-                <a:tc>
-                  <a:txBody>
-                    <a:bodyPr/>
-                    <a:lstStyle/>
-                    <a:p>
-                      <a:pPr algn="ctr">
-                        <a:spcAft>
-                          <a:spcPts val="0"/>
-                        </a:spcAft>
-                      </a:pPr>
-                      <a:r>
-                        <a:rPr lang="pt-BR" sz="2800" b="1" dirty="0">
-                          <a:solidFill>
-                            <a:srgbClr val="000000"/>
-                          </a:solidFill>
-                          <a:latin typeface="Arial"/>
-                          <a:ea typeface="Times New Roman"/>
-                        </a:rPr>
-                        <a:t>Abordagem proposta</a:t>
-                      </a:r>
-                      <a:endParaRPr lang="pt-BR" sz="2800" dirty="0">
-                        <a:latin typeface="Times New Roman"/>
-                        <a:ea typeface="Times New Roman"/>
-                      </a:endParaRPr>
-                    </a:p>
-                  </a:txBody>
-                  <a:tcPr marL="44450" marR="44450" marT="0" marB="0" anchor="ctr">
-                    <a:lnL>
-                      <a:noFill/>
-                    </a:lnL>
-                    <a:lnR>
-                      <a:noFill/>
-                    </a:lnR>
-                    <a:lnT w="12700" cap="flat" cmpd="sng" algn="ctr">
-                      <a:solidFill>
-                        <a:srgbClr val="000000"/>
-                      </a:solidFill>
-                      <a:prstDash val="solid"/>
-                      <a:round/>
-                      <a:headEnd type="none" w="med" len="med"/>
-                      <a:tailEnd type="none" w="med" len="med"/>
-                    </a:lnT>
-                    <a:lnB w="12700" cap="flat" cmpd="sng" algn="ctr">
-                      <a:solidFill>
-                        <a:srgbClr val="000000"/>
-                      </a:solidFill>
-                      <a:prstDash val="solid"/>
-                      <a:round/>
-                      <a:headEnd type="none" w="med" len="med"/>
-                      <a:tailEnd type="none" w="med" len="med"/>
-                    </a:lnB>
-                  </a:tcPr>
-                </a:tc>
-              </a:tr>
-              <a:tr h="1300976">
-                <a:tc>
-                  <a:txBody>
-                    <a:bodyPr/>
-                    <a:lstStyle/>
-                    <a:p>
-                      <a:pPr>
-                        <a:lnSpc>
-                          <a:spcPct val="115000"/>
-                        </a:lnSpc>
-                        <a:spcAft>
-                          <a:spcPts val="0"/>
-                        </a:spcAft>
-                      </a:pPr>
-                      <a:r>
-                        <a:rPr lang="pt-BR" sz="1800" b="1">
-                          <a:solidFill>
-                            <a:srgbClr val="000000"/>
-                          </a:solidFill>
-                          <a:latin typeface="Arial"/>
-                          <a:ea typeface="Times New Roman"/>
-                        </a:rPr>
-                        <a:t>SP 1.1</a:t>
-                      </a:r>
-                      <a:r>
-                        <a:rPr lang="pt-BR" sz="1800">
-                          <a:solidFill>
-                            <a:srgbClr val="000000"/>
-                          </a:solidFill>
-                          <a:latin typeface="Arial"/>
-                          <a:ea typeface="Times New Roman"/>
-                        </a:rPr>
-                        <a:t> Avaliar objetivamente processos realizados selecionado contra descrições aplicáveis processo, padrões e procedimentos.</a:t>
-                      </a:r>
-                      <a:endParaRPr lang="pt-BR" sz="1800">
-                        <a:latin typeface="Times New Roman"/>
-                        <a:ea typeface="Times New Roman"/>
-                      </a:endParaRPr>
-                    </a:p>
-                  </a:txBody>
-                  <a:tcPr marL="44450" marR="44450" marT="0" marB="0" anchor="ctr">
-                    <a:lnL>
-                      <a:noFill/>
-                    </a:lnL>
-                    <a:lnR w="12700" cap="flat" cmpd="sng" algn="ctr">
-                      <a:solidFill>
-                        <a:srgbClr val="000000"/>
-                      </a:solidFill>
-                      <a:prstDash val="solid"/>
-                      <a:round/>
-                      <a:headEnd type="none" w="med" len="med"/>
-                      <a:tailEnd type="none" w="med" len="med"/>
-                    </a:lnR>
-                    <a:lnT w="12700" cap="flat" cmpd="sng" algn="ctr">
-                      <a:solidFill>
-                        <a:srgbClr val="000000"/>
-                      </a:solidFill>
-                      <a:prstDash val="solid"/>
-                      <a:round/>
-                      <a:headEnd type="none" w="med" len="med"/>
-                      <a:tailEnd type="none" w="med" len="med"/>
-                    </a:lnT>
-                    <a:lnB w="12700" cap="flat" cmpd="sng" algn="ctr">
-                      <a:solidFill>
-                        <a:srgbClr val="000000"/>
-                      </a:solidFill>
-                      <a:prstDash val="solid"/>
-                      <a:round/>
-                      <a:headEnd type="none" w="med" len="med"/>
-                      <a:tailEnd type="none" w="med" len="med"/>
-                    </a:lnB>
-                  </a:tcPr>
-                </a:tc>
-                <a:tc>
-                  <a:txBody>
-                    <a:bodyPr/>
-                    <a:lstStyle/>
-                    <a:p>
-                      <a:pPr algn="just">
-                        <a:spcAft>
-                          <a:spcPts val="0"/>
-                        </a:spcAft>
-                      </a:pPr>
-                      <a:r>
-                        <a:rPr lang="pt-BR" sz="1800" b="1" dirty="0" smtClean="0">
-                          <a:solidFill>
-                            <a:srgbClr val="000000"/>
-                          </a:solidFill>
-                          <a:latin typeface="Arial"/>
-                          <a:ea typeface="Arial"/>
-                        </a:rPr>
-                        <a:t>4. Avaliar </a:t>
-                      </a:r>
-                      <a:r>
-                        <a:rPr lang="pt-BR" sz="1800" b="1" dirty="0">
-                          <a:solidFill>
-                            <a:srgbClr val="000000"/>
-                          </a:solidFill>
-                          <a:latin typeface="Arial"/>
-                          <a:ea typeface="Arial"/>
-                        </a:rPr>
-                        <a:t>objetivamente os processos.</a:t>
-                      </a:r>
-                      <a:endParaRPr lang="pt-BR" sz="1800" dirty="0">
-                        <a:latin typeface="Times New Roman"/>
-                        <a:ea typeface="Times New Roman"/>
-                      </a:endParaRPr>
-                    </a:p>
-                  </a:txBody>
-                  <a:tcPr marL="44450" marR="44450" marT="0" marB="0" anchor="ctr">
-                    <a:lnL w="12700" cap="flat" cmpd="sng" algn="ctr">
-                      <a:solidFill>
-                        <a:srgbClr val="000000"/>
-                      </a:solidFill>
-                      <a:prstDash val="solid"/>
-                      <a:round/>
-                      <a:headEnd type="none" w="med" len="med"/>
-                      <a:tailEnd type="none" w="med" len="med"/>
-                    </a:lnL>
-                    <a:lnR>
-                      <a:noFill/>
-                    </a:lnR>
-                    <a:lnT w="12700" cap="flat" cmpd="sng" algn="ctr">
-                      <a:solidFill>
-                        <a:srgbClr val="000000"/>
-                      </a:solidFill>
-                      <a:prstDash val="solid"/>
-                      <a:round/>
-                      <a:headEnd type="none" w="med" len="med"/>
-                      <a:tailEnd type="none" w="med" len="med"/>
-                    </a:lnT>
-                    <a:lnB w="12700" cap="flat" cmpd="sng" algn="ctr">
-                      <a:solidFill>
-                        <a:srgbClr val="000000"/>
-                      </a:solidFill>
-                      <a:prstDash val="solid"/>
-                      <a:round/>
-                      <a:headEnd type="none" w="med" len="med"/>
-                      <a:tailEnd type="none" w="med" len="med"/>
-                    </a:lnB>
-                  </a:tcPr>
-                </a:tc>
-              </a:tr>
-              <a:tr h="1300976">
-                <a:tc>
-                  <a:txBody>
-                    <a:bodyPr/>
-                    <a:lstStyle/>
-                    <a:p>
-                      <a:pPr>
-                        <a:lnSpc>
-                          <a:spcPct val="115000"/>
-                        </a:lnSpc>
-                        <a:spcAft>
-                          <a:spcPts val="0"/>
-                        </a:spcAft>
-                      </a:pPr>
-                      <a:r>
-                        <a:rPr lang="pt-BR" sz="1800" b="1">
-                          <a:solidFill>
-                            <a:srgbClr val="000000"/>
-                          </a:solidFill>
-                          <a:latin typeface="Arial"/>
-                          <a:ea typeface="Times New Roman"/>
-                        </a:rPr>
-                        <a:t>SP 1.2</a:t>
-                      </a:r>
-                      <a:r>
-                        <a:rPr lang="pt-BR" sz="1800">
-                          <a:solidFill>
-                            <a:srgbClr val="000000"/>
-                          </a:solidFill>
-                          <a:latin typeface="Arial"/>
-                          <a:ea typeface="Times New Roman"/>
-                        </a:rPr>
-                        <a:t> Avaliar objetivamente produtos de trabalho selecionado contra as descrições aplicáveis processo, padrões e procedimentos.</a:t>
-                      </a:r>
-                      <a:endParaRPr lang="pt-BR" sz="1800">
-                        <a:latin typeface="Times New Roman"/>
-                        <a:ea typeface="Times New Roman"/>
-                      </a:endParaRPr>
-                    </a:p>
-                  </a:txBody>
-                  <a:tcPr marL="44450" marR="44450" marT="0" marB="0" anchor="ctr">
-                    <a:lnL>
-                      <a:noFill/>
-                    </a:lnL>
-                    <a:lnR w="12700" cap="flat" cmpd="sng" algn="ctr">
-                      <a:solidFill>
-                        <a:srgbClr val="000000"/>
-                      </a:solidFill>
-                      <a:prstDash val="solid"/>
-                      <a:round/>
-                      <a:headEnd type="none" w="med" len="med"/>
-                      <a:tailEnd type="none" w="med" len="med"/>
-                    </a:lnR>
-                    <a:lnT w="12700" cap="flat" cmpd="sng" algn="ctr">
-                      <a:solidFill>
-                        <a:srgbClr val="000000"/>
-                      </a:solidFill>
-                      <a:prstDash val="solid"/>
-                      <a:round/>
-                      <a:headEnd type="none" w="med" len="med"/>
-                      <a:tailEnd type="none" w="med" len="med"/>
-                    </a:lnT>
-                    <a:lnB w="12700" cap="flat" cmpd="sng" algn="ctr">
-                      <a:solidFill>
-                        <a:srgbClr val="000000"/>
-                      </a:solidFill>
-                      <a:prstDash val="solid"/>
-                      <a:round/>
-                      <a:headEnd type="none" w="med" len="med"/>
-                      <a:tailEnd type="none" w="med" len="med"/>
-                    </a:lnB>
-                  </a:tcPr>
-                </a:tc>
-                <a:tc>
-                  <a:txBody>
-                    <a:bodyPr/>
-                    <a:lstStyle/>
-                    <a:p>
-                      <a:pPr algn="just">
-                        <a:spcAft>
-                          <a:spcPts val="0"/>
-                        </a:spcAft>
-                      </a:pPr>
-                      <a:r>
-                        <a:rPr lang="pt-BR" sz="1800" b="1" dirty="0" smtClean="0">
-                          <a:solidFill>
-                            <a:srgbClr val="000000"/>
-                          </a:solidFill>
-                          <a:latin typeface="Arial"/>
-                          <a:ea typeface="Arial"/>
-                        </a:rPr>
-                        <a:t>3. Avaliar </a:t>
-                      </a:r>
-                      <a:r>
-                        <a:rPr lang="pt-BR" sz="1800" b="1" dirty="0">
-                          <a:solidFill>
-                            <a:srgbClr val="000000"/>
-                          </a:solidFill>
-                          <a:latin typeface="Arial"/>
-                          <a:ea typeface="Arial"/>
-                        </a:rPr>
-                        <a:t>objetivamente os produtos de trabalho e serviços.</a:t>
-                      </a:r>
-                      <a:endParaRPr lang="pt-BR" sz="1800" dirty="0">
-                        <a:latin typeface="Times New Roman"/>
-                        <a:ea typeface="Times New Roman"/>
-                      </a:endParaRPr>
-                    </a:p>
-                  </a:txBody>
-                  <a:tcPr marL="44450" marR="44450" marT="0" marB="0" anchor="ctr">
-                    <a:lnL w="12700" cap="flat" cmpd="sng" algn="ctr">
-                      <a:solidFill>
-                        <a:srgbClr val="000000"/>
-                      </a:solidFill>
-                      <a:prstDash val="solid"/>
-                      <a:round/>
-                      <a:headEnd type="none" w="med" len="med"/>
-                      <a:tailEnd type="none" w="med" len="med"/>
-                    </a:lnL>
-                    <a:lnR>
-                      <a:noFill/>
-                    </a:lnR>
-                    <a:lnT w="12700" cap="flat" cmpd="sng" algn="ctr">
-                      <a:solidFill>
-                        <a:srgbClr val="000000"/>
-                      </a:solidFill>
-                      <a:prstDash val="solid"/>
-                      <a:round/>
-                      <a:headEnd type="none" w="med" len="med"/>
-                      <a:tailEnd type="none" w="med" len="med"/>
-                    </a:lnT>
-                    <a:lnB w="12700" cap="flat" cmpd="sng" algn="ctr">
-                      <a:solidFill>
-                        <a:srgbClr val="000000"/>
-                      </a:solidFill>
-                      <a:prstDash val="solid"/>
-                      <a:round/>
-                      <a:headEnd type="none" w="med" len="med"/>
-                      <a:tailEnd type="none" w="med" len="med"/>
-                    </a:lnB>
-                  </a:tcPr>
-                </a:tc>
-              </a:tr>
-              <a:tr h="1058893">
-                <a:tc>
-                  <a:txBody>
-                    <a:bodyPr/>
-                    <a:lstStyle/>
-                    <a:p>
-                      <a:pPr>
-                        <a:lnSpc>
-                          <a:spcPct val="115000"/>
-                        </a:lnSpc>
-                        <a:spcAft>
-                          <a:spcPts val="0"/>
-                        </a:spcAft>
-                      </a:pPr>
-                      <a:r>
-                        <a:rPr lang="pt-BR" sz="1800" b="1">
-                          <a:solidFill>
-                            <a:srgbClr val="000000"/>
-                          </a:solidFill>
-                          <a:latin typeface="Arial"/>
-                          <a:ea typeface="Times New Roman"/>
-                        </a:rPr>
-                        <a:t>SP 2.1</a:t>
-                      </a:r>
-                      <a:r>
-                        <a:rPr lang="pt-BR" sz="1800">
-                          <a:solidFill>
-                            <a:srgbClr val="000000"/>
-                          </a:solidFill>
-                          <a:latin typeface="Arial"/>
-                          <a:ea typeface="Times New Roman"/>
-                        </a:rPr>
-                        <a:t> Comunicar problemas de qualidade e garantir a resolução dos problemas de não conformidade com a equipe e gestores.</a:t>
-                      </a:r>
-                      <a:endParaRPr lang="pt-BR" sz="1800">
-                        <a:latin typeface="Times New Roman"/>
-                        <a:ea typeface="Times New Roman"/>
-                      </a:endParaRPr>
-                    </a:p>
-                  </a:txBody>
-                  <a:tcPr marL="44450" marR="44450" marT="0" marB="0" anchor="ctr">
-                    <a:lnL>
-                      <a:noFill/>
-                    </a:lnL>
-                    <a:lnR w="12700" cap="flat" cmpd="sng" algn="ctr">
-                      <a:solidFill>
-                        <a:srgbClr val="000000"/>
-                      </a:solidFill>
-                      <a:prstDash val="solid"/>
-                      <a:round/>
-                      <a:headEnd type="none" w="med" len="med"/>
-                      <a:tailEnd type="none" w="med" len="med"/>
-                    </a:lnR>
-                    <a:lnT w="12700" cap="flat" cmpd="sng" algn="ctr">
-                      <a:solidFill>
-                        <a:srgbClr val="000000"/>
-                      </a:solidFill>
-                      <a:prstDash val="solid"/>
-                      <a:round/>
-                      <a:headEnd type="none" w="med" len="med"/>
-                      <a:tailEnd type="none" w="med" len="med"/>
-                    </a:lnT>
-                    <a:lnB w="12700" cap="flat" cmpd="sng" algn="ctr">
-                      <a:solidFill>
-                        <a:srgbClr val="000000"/>
-                      </a:solidFill>
-                      <a:prstDash val="solid"/>
-                      <a:round/>
-                      <a:headEnd type="none" w="med" len="med"/>
-                      <a:tailEnd type="none" w="med" len="med"/>
-                    </a:lnB>
-                  </a:tcPr>
-                </a:tc>
-                <a:tc>
-                  <a:txBody>
-                    <a:bodyPr/>
-                    <a:lstStyle/>
-                    <a:p>
-                      <a:pPr algn="just">
-                        <a:spcAft>
-                          <a:spcPts val="0"/>
-                        </a:spcAft>
-                      </a:pPr>
-                      <a:r>
-                        <a:rPr lang="pt-BR" sz="1800" b="1" dirty="0" smtClean="0">
-                          <a:solidFill>
-                            <a:srgbClr val="000000"/>
-                          </a:solidFill>
-                          <a:latin typeface="Arial"/>
-                          <a:ea typeface="Arial"/>
-                        </a:rPr>
-                        <a:t>5. Elaborar relatório </a:t>
-                      </a:r>
-                      <a:r>
-                        <a:rPr lang="pt-BR" sz="1800" b="1" dirty="0">
-                          <a:solidFill>
-                            <a:srgbClr val="000000"/>
-                          </a:solidFill>
-                          <a:latin typeface="Arial"/>
-                          <a:ea typeface="Arial"/>
-                        </a:rPr>
-                        <a:t>de não conformidades.</a:t>
-                      </a:r>
-                      <a:endParaRPr lang="pt-BR" sz="1800" dirty="0">
-                        <a:latin typeface="Times New Roman"/>
-                        <a:ea typeface="Times New Roman"/>
-                      </a:endParaRPr>
-                    </a:p>
-                  </a:txBody>
-                  <a:tcPr marL="44450" marR="44450" marT="0" marB="0" anchor="ctr">
-                    <a:lnL w="12700" cap="flat" cmpd="sng" algn="ctr">
-                      <a:solidFill>
-                        <a:srgbClr val="000000"/>
-                      </a:solidFill>
-                      <a:prstDash val="solid"/>
-                      <a:round/>
-                      <a:headEnd type="none" w="med" len="med"/>
-                      <a:tailEnd type="none" w="med" len="med"/>
-                    </a:lnL>
-                    <a:lnR>
-                      <a:noFill/>
-                    </a:lnR>
-                    <a:lnT w="12700" cap="flat" cmpd="sng" algn="ctr">
-                      <a:solidFill>
-                        <a:srgbClr val="000000"/>
-                      </a:solidFill>
-                      <a:prstDash val="solid"/>
-                      <a:round/>
-                      <a:headEnd type="none" w="med" len="med"/>
-                      <a:tailEnd type="none" w="med" len="med"/>
-                    </a:lnT>
-                    <a:lnB w="12700" cap="flat" cmpd="sng" algn="ctr">
-                      <a:solidFill>
-                        <a:srgbClr val="000000"/>
-                      </a:solidFill>
-                      <a:prstDash val="solid"/>
-                      <a:round/>
-                      <a:headEnd type="none" w="med" len="med"/>
-                      <a:tailEnd type="none" w="med" len="med"/>
-                    </a:lnB>
-                  </a:tcPr>
-                </a:tc>
-              </a:tr>
-              <a:tr h="288675">
-                <a:tc rowSpan="3">
-                  <a:txBody>
-                    <a:bodyPr/>
-                    <a:lstStyle/>
-                    <a:p>
-                      <a:pPr>
-                        <a:lnSpc>
-                          <a:spcPct val="115000"/>
-                        </a:lnSpc>
-                        <a:spcAft>
-                          <a:spcPts val="0"/>
-                        </a:spcAft>
-                      </a:pPr>
-                      <a:r>
-                        <a:rPr lang="pt-BR" sz="1800" b="1">
-                          <a:solidFill>
-                            <a:srgbClr val="000000"/>
-                          </a:solidFill>
-                          <a:latin typeface="Arial"/>
-                          <a:ea typeface="Times New Roman"/>
-                        </a:rPr>
-                        <a:t>SP 2.2</a:t>
-                      </a:r>
-                      <a:r>
-                        <a:rPr lang="pt-BR" sz="1800">
-                          <a:solidFill>
-                            <a:srgbClr val="000000"/>
-                          </a:solidFill>
-                          <a:latin typeface="Arial"/>
-                          <a:ea typeface="Times New Roman"/>
-                        </a:rPr>
-                        <a:t> Estabelecer e manter registros das atividades de garantia de qualidade.</a:t>
-                      </a:r>
-                      <a:endParaRPr lang="pt-BR" sz="1800">
-                        <a:latin typeface="Times New Roman"/>
-                        <a:ea typeface="Times New Roman"/>
-                      </a:endParaRPr>
-                    </a:p>
-                  </a:txBody>
-                  <a:tcPr marL="44450" marR="44450" marT="0" marB="0" anchor="ctr">
-                    <a:lnL>
-                      <a:noFill/>
-                    </a:lnL>
-                    <a:lnR w="12700" cap="flat" cmpd="sng" algn="ctr">
-                      <a:solidFill>
-                        <a:srgbClr val="000000"/>
-                      </a:solidFill>
-                      <a:prstDash val="solid"/>
-                      <a:round/>
-                      <a:headEnd type="none" w="med" len="med"/>
-                      <a:tailEnd type="none" w="med" len="med"/>
-                    </a:lnR>
-                    <a:lnT w="12700" cap="flat" cmpd="sng" algn="ctr">
-                      <a:solidFill>
-                        <a:srgbClr val="000000"/>
-                      </a:solidFill>
-                      <a:prstDash val="solid"/>
-                      <a:round/>
-                      <a:headEnd type="none" w="med" len="med"/>
-                      <a:tailEnd type="none" w="med" len="med"/>
-                    </a:lnT>
-                    <a:lnB w="12700" cap="flat" cmpd="sng" algn="ctr">
-                      <a:solidFill>
-                        <a:srgbClr val="000000"/>
-                      </a:solidFill>
-                      <a:prstDash val="solid"/>
-                      <a:round/>
-                      <a:headEnd type="none" w="med" len="med"/>
-                      <a:tailEnd type="none" w="med" len="med"/>
-                    </a:lnB>
-                  </a:tcPr>
-                </a:tc>
-                <a:tc>
-                  <a:txBody>
-                    <a:bodyPr/>
-                    <a:lstStyle/>
-                    <a:p>
-                      <a:pPr algn="just">
-                        <a:spcAft>
-                          <a:spcPts val="0"/>
-                        </a:spcAft>
-                      </a:pPr>
-                      <a:r>
-                        <a:rPr lang="pt-BR" sz="1800" b="1" dirty="0">
-                          <a:solidFill>
-                            <a:srgbClr val="000000"/>
-                          </a:solidFill>
-                          <a:latin typeface="Arial"/>
-                          <a:ea typeface="Arial"/>
-                        </a:rPr>
-                        <a:t>2</a:t>
-                      </a:r>
-                      <a:r>
-                        <a:rPr lang="pt-BR" sz="1800" b="1" dirty="0" smtClean="0">
-                          <a:solidFill>
-                            <a:srgbClr val="000000"/>
-                          </a:solidFill>
-                          <a:latin typeface="Arial"/>
-                          <a:ea typeface="Arial"/>
-                        </a:rPr>
-                        <a:t>.</a:t>
-                      </a:r>
-                      <a:r>
-                        <a:rPr lang="pt-BR" sz="1800" b="1" dirty="0">
-                          <a:solidFill>
-                            <a:srgbClr val="000000"/>
-                          </a:solidFill>
-                          <a:latin typeface="Arial"/>
-                          <a:ea typeface="Arial"/>
-                        </a:rPr>
-                        <a:t> </a:t>
-                      </a:r>
-                      <a:r>
-                        <a:rPr lang="pt-BR" sz="1800" b="1" dirty="0" smtClean="0">
-                          <a:solidFill>
-                            <a:srgbClr val="000000"/>
-                          </a:solidFill>
-                          <a:latin typeface="Arial"/>
-                          <a:ea typeface="Arial"/>
-                        </a:rPr>
-                        <a:t>Elaborar </a:t>
-                      </a:r>
-                      <a:r>
-                        <a:rPr lang="pt-BR" sz="1800" b="1" dirty="0">
-                          <a:solidFill>
-                            <a:srgbClr val="000000"/>
-                          </a:solidFill>
-                          <a:latin typeface="Arial"/>
-                          <a:ea typeface="Arial"/>
-                        </a:rPr>
-                        <a:t>plano de qualidade.</a:t>
-                      </a:r>
-                      <a:endParaRPr lang="pt-BR" sz="1800" dirty="0">
-                        <a:latin typeface="Times New Roman"/>
-                        <a:ea typeface="Times New Roman"/>
-                      </a:endParaRPr>
-                    </a:p>
-                  </a:txBody>
-                  <a:tcPr marL="44450" marR="44450" marT="0" marB="0" anchor="ctr">
-                    <a:lnL w="12700" cap="flat" cmpd="sng" algn="ctr">
-                      <a:solidFill>
-                        <a:srgbClr val="000000"/>
-                      </a:solidFill>
-                      <a:prstDash val="solid"/>
-                      <a:round/>
-                      <a:headEnd type="none" w="med" len="med"/>
-                      <a:tailEnd type="none" w="med" len="med"/>
-                    </a:lnL>
-                    <a:lnR>
-                      <a:noFill/>
-                    </a:lnR>
-                    <a:lnT w="12700" cap="flat" cmpd="sng" algn="ctr">
-                      <a:solidFill>
-                        <a:srgbClr val="000000"/>
-                      </a:solidFill>
-                      <a:prstDash val="solid"/>
-                      <a:round/>
-                      <a:headEnd type="none" w="med" len="med"/>
-                      <a:tailEnd type="none" w="med" len="med"/>
-                    </a:lnT>
-                    <a:lnB w="12700" cap="flat" cmpd="sng" algn="ctr">
-                      <a:solidFill>
-                        <a:srgbClr val="000000"/>
-                      </a:solidFill>
-                      <a:prstDash val="solid"/>
-                      <a:round/>
-                      <a:headEnd type="none" w="med" len="med"/>
-                      <a:tailEnd type="none" w="med" len="med"/>
-                    </a:lnB>
-                  </a:tcPr>
-                </a:tc>
-              </a:tr>
-              <a:tr h="577350">
-                <a:tc vMerge="1">
-                  <a:txBody>
-                    <a:bodyPr/>
-                    <a:lstStyle/>
-                    <a:p>
-                      <a:endParaRPr lang="pt-BR"/>
-                    </a:p>
-                  </a:txBody>
-                  <a:tcPr/>
-                </a:tc>
-                <a:tc>
-                  <a:txBody>
-                    <a:bodyPr/>
-                    <a:lstStyle/>
-                    <a:p>
-                      <a:pPr algn="just">
-                        <a:spcAft>
-                          <a:spcPts val="0"/>
-                        </a:spcAft>
-                      </a:pPr>
-                      <a:r>
-                        <a:rPr lang="pt-BR" sz="1800" b="1" dirty="0" smtClean="0">
-                          <a:solidFill>
-                            <a:srgbClr val="000000"/>
-                          </a:solidFill>
-                          <a:latin typeface="Arial"/>
-                          <a:ea typeface="Arial"/>
-                        </a:rPr>
-                        <a:t>6. Elaborar </a:t>
-                      </a:r>
-                      <a:r>
-                        <a:rPr lang="pt-BR" sz="1800" b="1" dirty="0">
-                          <a:solidFill>
-                            <a:srgbClr val="000000"/>
-                          </a:solidFill>
-                          <a:latin typeface="Arial"/>
-                          <a:ea typeface="Arial"/>
-                        </a:rPr>
-                        <a:t>relatório periódico de garantia da qualidade.</a:t>
-                      </a:r>
-                      <a:endParaRPr lang="pt-BR" sz="1800" dirty="0">
-                        <a:latin typeface="Times New Roman"/>
-                        <a:ea typeface="Times New Roman"/>
-                      </a:endParaRPr>
-                    </a:p>
-                  </a:txBody>
-                  <a:tcPr marL="44450" marR="44450" marT="0" marB="0" anchor="ctr">
-                    <a:lnL w="12700" cap="flat" cmpd="sng" algn="ctr">
-                      <a:solidFill>
-                        <a:srgbClr val="000000"/>
-                      </a:solidFill>
-                      <a:prstDash val="solid"/>
-                      <a:round/>
-                      <a:headEnd type="none" w="med" len="med"/>
-                      <a:tailEnd type="none" w="med" len="med"/>
-                    </a:lnL>
-                    <a:lnR>
-                      <a:noFill/>
-                    </a:lnR>
-                    <a:lnT w="12700" cap="flat" cmpd="sng" algn="ctr">
-                      <a:solidFill>
-                        <a:srgbClr val="000000"/>
-                      </a:solidFill>
-                      <a:prstDash val="solid"/>
-                      <a:round/>
-                      <a:headEnd type="none" w="med" len="med"/>
-                      <a:tailEnd type="none" w="med" len="med"/>
-                    </a:lnT>
-                    <a:lnB w="12700" cap="flat" cmpd="sng" algn="ctr">
-                      <a:solidFill>
-                        <a:srgbClr val="000000"/>
-                      </a:solidFill>
-                      <a:prstDash val="solid"/>
-                      <a:round/>
-                      <a:headEnd type="none" w="med" len="med"/>
-                      <a:tailEnd type="none" w="med" len="med"/>
-                    </a:lnB>
-                  </a:tcPr>
-                </a:tc>
-              </a:tr>
-              <a:tr h="577350">
-                <a:tc vMerge="1">
-                  <a:txBody>
-                    <a:bodyPr/>
-                    <a:lstStyle/>
-                    <a:p>
-                      <a:endParaRPr lang="pt-BR"/>
-                    </a:p>
-                  </a:txBody>
-                  <a:tcPr/>
-                </a:tc>
-                <a:tc>
-                  <a:txBody>
-                    <a:bodyPr/>
-                    <a:lstStyle/>
-                    <a:p>
-                      <a:pPr algn="just">
-                        <a:spcAft>
-                          <a:spcPts val="0"/>
-                        </a:spcAft>
-                      </a:pPr>
-                      <a:r>
-                        <a:rPr lang="pt-BR" sz="1800" b="1" dirty="0" smtClean="0">
-                          <a:solidFill>
-                            <a:srgbClr val="000000"/>
-                          </a:solidFill>
-                          <a:latin typeface="Arial"/>
-                          <a:ea typeface="Arial"/>
-                        </a:rPr>
-                        <a:t>8.</a:t>
-                      </a:r>
-                      <a:r>
-                        <a:rPr lang="pt-BR" sz="1800" b="1" dirty="0">
-                          <a:solidFill>
-                            <a:srgbClr val="000000"/>
-                          </a:solidFill>
-                          <a:latin typeface="Arial"/>
-                          <a:ea typeface="Arial"/>
-                        </a:rPr>
-                        <a:t> </a:t>
-                      </a:r>
-                      <a:r>
-                        <a:rPr lang="pt-BR" sz="1800" b="1" dirty="0" smtClean="0">
-                          <a:solidFill>
-                            <a:srgbClr val="000000"/>
-                          </a:solidFill>
-                          <a:latin typeface="Arial"/>
-                          <a:ea typeface="Arial"/>
-                        </a:rPr>
-                        <a:t>Elaborar </a:t>
-                      </a:r>
-                      <a:r>
-                        <a:rPr lang="pt-BR" sz="1800" b="1" dirty="0">
-                          <a:solidFill>
-                            <a:srgbClr val="000000"/>
-                          </a:solidFill>
-                          <a:latin typeface="Arial"/>
-                          <a:ea typeface="Arial"/>
-                        </a:rPr>
-                        <a:t>relatório de lições aprendidas do projeto.</a:t>
-                      </a:r>
-                      <a:endParaRPr lang="pt-BR" sz="1800" dirty="0">
-                        <a:latin typeface="Times New Roman"/>
-                        <a:ea typeface="Times New Roman"/>
-                      </a:endParaRPr>
-                    </a:p>
-                  </a:txBody>
-                  <a:tcPr marL="44450" marR="44450" marT="0" marB="0" anchor="ctr">
-                    <a:lnL w="12700" cap="flat" cmpd="sng" algn="ctr">
-                      <a:solidFill>
-                        <a:srgbClr val="000000"/>
-                      </a:solidFill>
-                      <a:prstDash val="solid"/>
-                      <a:round/>
-                      <a:headEnd type="none" w="med" len="med"/>
-                      <a:tailEnd type="none" w="med" len="med"/>
-                    </a:lnL>
-                    <a:lnR>
-                      <a:noFill/>
-                    </a:lnR>
-                    <a:lnT w="12700" cap="flat" cmpd="sng" algn="ctr">
-                      <a:solidFill>
-                        <a:srgbClr val="000000"/>
-                      </a:solidFill>
-                      <a:prstDash val="solid"/>
-                      <a:round/>
-                      <a:headEnd type="none" w="med" len="med"/>
-                      <a:tailEnd type="none" w="med" len="med"/>
-                    </a:lnT>
-                    <a:lnB w="12700" cap="flat" cmpd="sng" algn="ctr">
-                      <a:solidFill>
-                        <a:srgbClr val="000000"/>
-                      </a:solidFill>
-                      <a:prstDash val="solid"/>
-                      <a:round/>
-                      <a:headEnd type="none" w="med" len="med"/>
-                      <a:tailEnd type="none" w="med" len="med"/>
-                    </a:lnB>
-                  </a:tcPr>
-                </a:tc>
-              </a:tr>
-              <a:tr h="497219">
-                <a:tc rowSpan="3">
-                  <a:txBody>
-                    <a:bodyPr/>
-                    <a:lstStyle/>
-                    <a:p>
-                      <a:pPr>
-                        <a:lnSpc>
-                          <a:spcPct val="115000"/>
-                        </a:lnSpc>
-                        <a:spcAft>
-                          <a:spcPts val="0"/>
-                        </a:spcAft>
-                      </a:pPr>
-                      <a:r>
-                        <a:rPr lang="pt-BR" sz="1800" i="1" dirty="0">
-                          <a:solidFill>
-                            <a:srgbClr val="000000"/>
-                          </a:solidFill>
-                          <a:latin typeface="Arial"/>
-                          <a:ea typeface="Times New Roman"/>
-                        </a:rPr>
-                        <a:t>Extra - Atividade de Suporte e Informativas</a:t>
-                      </a:r>
-                      <a:endParaRPr lang="pt-BR" sz="1800" dirty="0">
-                        <a:latin typeface="Times New Roman"/>
-                        <a:ea typeface="Times New Roman"/>
-                      </a:endParaRPr>
-                    </a:p>
-                  </a:txBody>
-                  <a:tcPr marL="44450" marR="44450" marT="0" marB="0" anchor="ctr">
-                    <a:lnL>
-                      <a:noFill/>
-                    </a:lnL>
-                    <a:lnR w="12700" cap="flat" cmpd="sng" algn="ctr">
-                      <a:solidFill>
-                        <a:srgbClr val="000000"/>
-                      </a:solidFill>
-                      <a:prstDash val="solid"/>
-                      <a:round/>
-                      <a:headEnd type="none" w="med" len="med"/>
-                      <a:tailEnd type="none" w="med" len="med"/>
-                    </a:lnR>
-                    <a:lnT w="12700" cap="flat" cmpd="sng" algn="ctr">
-                      <a:solidFill>
-                        <a:srgbClr val="000000"/>
-                      </a:solidFill>
-                      <a:prstDash val="solid"/>
-                      <a:round/>
-                      <a:headEnd type="none" w="med" len="med"/>
-                      <a:tailEnd type="none" w="med" len="med"/>
-                    </a:lnT>
-                    <a:lnB w="19050" cap="flat" cmpd="sng" algn="ctr">
-                      <a:solidFill>
-                        <a:srgbClr val="000000"/>
-                      </a:solidFill>
-                      <a:prstDash val="solid"/>
-                      <a:round/>
-                      <a:headEnd type="none" w="med" len="med"/>
-                      <a:tailEnd type="none" w="med" len="med"/>
-                    </a:lnB>
-                  </a:tcPr>
-                </a:tc>
-                <a:tc>
-                  <a:txBody>
-                    <a:bodyPr/>
-                    <a:lstStyle/>
-                    <a:p>
-                      <a:pPr marL="0" marR="0" indent="0" algn="just" defTabSz="914400" rtl="0" eaLnBrk="1" fontAlgn="auto" latinLnBrk="0" hangingPunct="1">
-                        <a:lnSpc>
-                          <a:spcPct val="100000"/>
-                        </a:lnSpc>
-                        <a:spcBef>
-                          <a:spcPts val="0"/>
-                        </a:spcBef>
-                        <a:spcAft>
-                          <a:spcPts val="0"/>
-                        </a:spcAft>
-                        <a:buClrTx/>
-                        <a:buSzTx/>
-                        <a:buFontTx/>
-                        <a:buNone/>
-                        <a:tabLst/>
-                        <a:defRPr/>
-                      </a:pPr>
-                      <a:r>
-                        <a:rPr lang="pt-BR" sz="1800" b="1" dirty="0" smtClean="0">
-                          <a:solidFill>
-                            <a:srgbClr val="000000"/>
-                          </a:solidFill>
-                          <a:latin typeface="Arial"/>
-                          <a:ea typeface="Arial"/>
-                        </a:rPr>
-                        <a:t>1. Disponibilizar materiais de treinamento para os integrantes do projeto.</a:t>
-                      </a:r>
-                      <a:endParaRPr lang="pt-BR" sz="1800" dirty="0" smtClean="0">
-                        <a:latin typeface="+mn-lt"/>
-                        <a:ea typeface="Times New Roman"/>
-                      </a:endParaRPr>
-                    </a:p>
-                  </a:txBody>
-                  <a:tcPr marL="44450" marR="44450" marT="0" marB="0" anchor="ctr">
-                    <a:lnL w="12700" cap="flat" cmpd="sng" algn="ctr">
-                      <a:solidFill>
-                        <a:srgbClr val="000000"/>
-                      </a:solidFill>
-                      <a:prstDash val="solid"/>
-                      <a:round/>
-                      <a:headEnd type="none" w="med" len="med"/>
-                      <a:tailEnd type="none" w="med" len="med"/>
-                    </a:lnL>
-                    <a:lnR>
-                      <a:noFill/>
-                    </a:lnR>
-                    <a:lnT w="12700" cap="flat" cmpd="sng" algn="ctr">
-                      <a:solidFill>
-                        <a:srgbClr val="000000"/>
-                      </a:solidFill>
-                      <a:prstDash val="solid"/>
-                      <a:round/>
-                      <a:headEnd type="none" w="med" len="med"/>
-                      <a:tailEnd type="none" w="med" len="med"/>
-                    </a:lnT>
-                    <a:lnB w="12700" cap="flat" cmpd="sng" algn="ctr">
-                      <a:solidFill>
-                        <a:srgbClr val="000000"/>
-                      </a:solidFill>
-                      <a:prstDash val="solid"/>
-                      <a:round/>
-                      <a:headEnd type="none" w="med" len="med"/>
-                      <a:tailEnd type="none" w="med" len="med"/>
-                    </a:lnB>
-                  </a:tcPr>
-                </a:tc>
-              </a:tr>
-              <a:tr h="866025">
-                <a:tc vMerge="1">
-                  <a:txBody>
-                    <a:bodyPr/>
-                    <a:lstStyle/>
-                    <a:p>
-                      <a:endParaRPr lang="pt-BR"/>
-                    </a:p>
-                  </a:txBody>
-                  <a:tcPr/>
-                </a:tc>
-                <a:tc>
-                  <a:txBody>
-                    <a:bodyPr/>
-                    <a:lstStyle/>
-                    <a:p>
-                      <a:pPr marL="0" marR="0" indent="0" algn="just" defTabSz="914400" rtl="0" eaLnBrk="1" fontAlgn="auto" latinLnBrk="0" hangingPunct="1">
-                        <a:lnSpc>
-                          <a:spcPct val="100000"/>
-                        </a:lnSpc>
-                        <a:spcBef>
-                          <a:spcPts val="0"/>
-                        </a:spcBef>
-                        <a:spcAft>
-                          <a:spcPts val="0"/>
-                        </a:spcAft>
-                        <a:buClrTx/>
-                        <a:buSzTx/>
-                        <a:buFontTx/>
-                        <a:buNone/>
-                        <a:tabLst/>
-                        <a:defRPr/>
-                      </a:pPr>
-                      <a:r>
-                        <a:rPr lang="pt-BR" sz="1800" b="1" dirty="0" smtClean="0">
-                          <a:solidFill>
-                            <a:srgbClr val="000000"/>
-                          </a:solidFill>
-                          <a:latin typeface="Arial"/>
-                          <a:ea typeface="Arial"/>
-                        </a:rPr>
-                        <a:t>4. Aprovar produto final para entrega.</a:t>
-                      </a:r>
-                      <a:endParaRPr lang="pt-BR" sz="1800" dirty="0">
-                        <a:latin typeface="Times New Roman"/>
-                        <a:ea typeface="Times New Roman"/>
-                      </a:endParaRPr>
-                    </a:p>
-                  </a:txBody>
-                  <a:tcPr marL="44450" marR="44450" marT="0" marB="0" anchor="ctr">
-                    <a:lnL w="12700" cap="flat" cmpd="sng" algn="ctr">
-                      <a:solidFill>
-                        <a:srgbClr val="000000"/>
-                      </a:solidFill>
-                      <a:prstDash val="solid"/>
-                      <a:round/>
-                      <a:headEnd type="none" w="med" len="med"/>
-                      <a:tailEnd type="none" w="med" len="med"/>
-                    </a:lnL>
-                    <a:lnR>
-                      <a:noFill/>
-                    </a:lnR>
-                    <a:lnT w="12700" cap="flat" cmpd="sng" algn="ctr">
-                      <a:solidFill>
-                        <a:srgbClr val="000000"/>
-                      </a:solidFill>
-                      <a:prstDash val="solid"/>
-                      <a:round/>
-                      <a:headEnd type="none" w="med" len="med"/>
-                      <a:tailEnd type="none" w="med" len="med"/>
-                    </a:lnT>
-                    <a:lnB w="12700" cap="flat" cmpd="sng" algn="ctr">
-                      <a:solidFill>
-                        <a:srgbClr val="000000"/>
-                      </a:solidFill>
-                      <a:prstDash val="solid"/>
-                      <a:round/>
-                      <a:headEnd type="none" w="med" len="med"/>
-                      <a:tailEnd type="none" w="med" len="med"/>
-                    </a:lnB>
-                  </a:tcPr>
-                </a:tc>
-              </a:tr>
-              <a:tr h="870543">
-                <a:tc vMerge="1">
-                  <a:txBody>
-                    <a:bodyPr/>
-                    <a:lstStyle/>
-                    <a:p>
-                      <a:endParaRPr lang="pt-BR"/>
-                    </a:p>
-                  </a:txBody>
-                  <a:tcPr/>
-                </a:tc>
-                <a:tc>
-                  <a:txBody>
-                    <a:bodyPr/>
-                    <a:lstStyle/>
-                    <a:p>
-                      <a:pPr algn="just">
-                        <a:spcAft>
-                          <a:spcPts val="0"/>
-                        </a:spcAft>
-                      </a:pPr>
-                      <a:r>
-                        <a:rPr lang="pt-BR" sz="1800" b="1" dirty="0">
-                          <a:solidFill>
-                            <a:srgbClr val="000000"/>
-                          </a:solidFill>
-                          <a:latin typeface="Arial"/>
-                          <a:ea typeface="Arial"/>
-                        </a:rPr>
-                        <a:t>9</a:t>
-                      </a:r>
-                      <a:r>
-                        <a:rPr lang="pt-BR" sz="1800" b="1" dirty="0" smtClean="0">
-                          <a:solidFill>
-                            <a:srgbClr val="000000"/>
-                          </a:solidFill>
-                          <a:latin typeface="Arial"/>
-                          <a:ea typeface="Arial"/>
-                        </a:rPr>
-                        <a:t>. Prestar </a:t>
-                      </a:r>
-                      <a:r>
-                        <a:rPr lang="pt-BR" sz="1800" b="1" dirty="0">
-                          <a:solidFill>
-                            <a:srgbClr val="000000"/>
-                          </a:solidFill>
-                          <a:latin typeface="Arial"/>
-                          <a:ea typeface="Arial"/>
-                        </a:rPr>
-                        <a:t>suporte a todos os envolvidos no projeto.</a:t>
-                      </a:r>
-                      <a:endParaRPr lang="pt-BR" sz="1800" dirty="0">
-                        <a:latin typeface="Times New Roman"/>
-                        <a:ea typeface="Times New Roman"/>
-                      </a:endParaRPr>
-                    </a:p>
-                  </a:txBody>
-                  <a:tcPr marL="44450" marR="44450" marT="0" marB="0" anchor="ctr">
-                    <a:lnL w="12700" cap="flat" cmpd="sng" algn="ctr">
-                      <a:solidFill>
-                        <a:srgbClr val="000000"/>
-                      </a:solidFill>
-                      <a:prstDash val="solid"/>
-                      <a:round/>
-                      <a:headEnd type="none" w="med" len="med"/>
-                      <a:tailEnd type="none" w="med" len="med"/>
-                    </a:lnL>
-                    <a:lnR>
-                      <a:noFill/>
-                    </a:lnR>
-                    <a:lnT w="12700" cap="flat" cmpd="sng" algn="ctr">
-                      <a:solidFill>
-                        <a:srgbClr val="000000"/>
-                      </a:solidFill>
-                      <a:prstDash val="solid"/>
-                      <a:round/>
-                      <a:headEnd type="none" w="med" len="med"/>
-                      <a:tailEnd type="none" w="med" len="med"/>
-                    </a:lnT>
-                    <a:lnB w="19050" cap="flat" cmpd="sng" algn="ctr">
-                      <a:solidFill>
-                        <a:srgbClr val="000000"/>
-                      </a:solidFill>
-                      <a:prstDash val="solid"/>
-                      <a:round/>
-                      <a:headEnd type="none" w="med" len="med"/>
-                      <a:tailEnd type="none" w="med" len="med"/>
-                    </a:lnB>
-                  </a:tcPr>
-                </a:tc>
-              </a:tr>
-            </a:tbl>
-          </a:graphicData>
-        </a:graphic>
-      </p:graphicFrame>
       <p:graphicFrame>
         <p:nvGraphicFramePr>
           <p:cNvPr id="5" name="Table 4"/>
@@ -6910,7 +5653,7 @@
           <p:nvPr>
             <p:extLst>
               <p:ext uri="{D42A27DB-BD31-4B8C-83A1-F6EECF244321}">
-                <p14:modId xmlns:p14="http://schemas.microsoft.com/office/powerpoint/2010/main" xmlns="" val="1160258519"/>
+                <p14:modId xmlns:p14="http://schemas.microsoft.com/office/powerpoint/2010/main" val="1160258519"/>
               </p:ext>
             </p:extLst>
           </p:nvPr>
@@ -9595,24 +8338,1525 @@
           </a:fontRef>
         </p:style>
       </p:cxnSp>
+      <p:graphicFrame>
+        <p:nvGraphicFramePr>
+          <p:cNvPr id="43" name="Table 42"/>
+          <p:cNvGraphicFramePr>
+            <a:graphicFrameLocks noGrp="1"/>
+          </p:cNvGraphicFramePr>
+          <p:nvPr>
+            <p:extLst>
+              <p:ext uri="{D42A27DB-BD31-4B8C-83A1-F6EECF244321}">
+                <p14:modId xmlns:p14="http://schemas.microsoft.com/office/powerpoint/2010/main" val="1767228960"/>
+              </p:ext>
+            </p:extLst>
+          </p:nvPr>
+        </p:nvGraphicFramePr>
+        <p:xfrm>
+          <a:off x="1872433" y="20265587"/>
+          <a:ext cx="10369152" cy="10683254"/>
+        </p:xfrm>
+        <a:graphic>
+          <a:graphicData uri="http://schemas.openxmlformats.org/drawingml/2006/table">
+            <a:tbl>
+              <a:tblPr firstRow="1" firstCol="1" bandRow="1"/>
+              <a:tblGrid>
+                <a:gridCol w="5184576"/>
+                <a:gridCol w="5184576"/>
+              </a:tblGrid>
+              <a:tr h="1016276">
+                <a:tc gridSpan="2">
+                  <a:txBody>
+                    <a:bodyPr/>
+                    <a:lstStyle/>
+                    <a:p>
+                      <a:pPr algn="ctr">
+                        <a:spcBef>
+                          <a:spcPts val="300"/>
+                        </a:spcBef>
+                        <a:spcAft>
+                          <a:spcPts val="0"/>
+                        </a:spcAft>
+                      </a:pPr>
+                      <a:r>
+                        <a:rPr lang="pt-BR" sz="3000" b="1" dirty="0" smtClean="0">
+                          <a:solidFill>
+                            <a:srgbClr val="000000"/>
+                          </a:solidFill>
+                          <a:effectLst/>
+                          <a:latin typeface="Arial"/>
+                          <a:ea typeface="Times New Roman"/>
+                        </a:rPr>
+                        <a:t>Aderência do método proposto</a:t>
+                      </a:r>
+                      <a:endParaRPr lang="en-GB" sz="3000" dirty="0">
+                        <a:effectLst/>
+                        <a:latin typeface="Times New Roman"/>
+                        <a:ea typeface="SimSun"/>
+                      </a:endParaRPr>
+                    </a:p>
+                  </a:txBody>
+                  <a:tcPr marL="41855" marR="41855" marT="0" marB="0" anchor="ctr">
+                    <a:lnL>
+                      <a:noFill/>
+                    </a:lnL>
+                    <a:lnR>
+                      <a:noFill/>
+                    </a:lnR>
+                    <a:lnT w="76200" cap="flat" cmpd="sng" algn="ctr">
+                      <a:solidFill>
+                        <a:srgbClr val="000000"/>
+                      </a:solidFill>
+                      <a:prstDash val="solid"/>
+                      <a:round/>
+                      <a:headEnd type="none" w="med" len="med"/>
+                      <a:tailEnd type="none" w="med" len="med"/>
+                    </a:lnT>
+                    <a:lnB w="38100" cap="flat" cmpd="sng" algn="ctr">
+                      <a:solidFill>
+                        <a:srgbClr val="000000"/>
+                      </a:solidFill>
+                      <a:prstDash val="solid"/>
+                      <a:round/>
+                      <a:headEnd type="none" w="med" len="med"/>
+                      <a:tailEnd type="none" w="med" len="med"/>
+                    </a:lnB>
+                  </a:tcPr>
+                </a:tc>
+                <a:tc hMerge="1">
+                  <a:txBody>
+                    <a:bodyPr/>
+                    <a:lstStyle/>
+                    <a:p>
+                      <a:endParaRPr lang="en-GB"/>
+                    </a:p>
+                  </a:txBody>
+                  <a:tcPr/>
+                </a:tc>
+              </a:tr>
+              <a:tr h="370736">
+                <a:tc>
+                  <a:txBody>
+                    <a:bodyPr/>
+                    <a:lstStyle/>
+                    <a:p>
+                      <a:pPr algn="ctr">
+                        <a:spcBef>
+                          <a:spcPts val="300"/>
+                        </a:spcBef>
+                        <a:spcAft>
+                          <a:spcPts val="0"/>
+                        </a:spcAft>
+                      </a:pPr>
+                      <a:r>
+                        <a:rPr lang="pt-BR" sz="3000" b="1" dirty="0">
+                          <a:solidFill>
+                            <a:srgbClr val="000000"/>
+                          </a:solidFill>
+                          <a:effectLst/>
+                          <a:latin typeface="Arial"/>
+                          <a:ea typeface="Times New Roman"/>
+                        </a:rPr>
+                        <a:t>CMMI-DEV - PPQA</a:t>
+                      </a:r>
+                      <a:endParaRPr lang="en-GB" sz="3000" dirty="0">
+                        <a:effectLst/>
+                        <a:latin typeface="Times New Roman"/>
+                        <a:ea typeface="SimSun"/>
+                      </a:endParaRPr>
+                    </a:p>
+                  </a:txBody>
+                  <a:tcPr marL="41855" marR="41855" marT="0" marB="0" anchor="ctr">
+                    <a:lnL>
+                      <a:noFill/>
+                    </a:lnL>
+                    <a:lnR>
+                      <a:noFill/>
+                    </a:lnR>
+                    <a:lnT w="38100" cap="flat" cmpd="sng" algn="ctr">
+                      <a:solidFill>
+                        <a:srgbClr val="000000"/>
+                      </a:solidFill>
+                      <a:prstDash val="solid"/>
+                      <a:round/>
+                      <a:headEnd type="none" w="med" len="med"/>
+                      <a:tailEnd type="none" w="med" len="med"/>
+                    </a:lnT>
+                    <a:lnB w="12700" cap="flat" cmpd="sng" algn="ctr">
+                      <a:solidFill>
+                        <a:srgbClr val="000000"/>
+                      </a:solidFill>
+                      <a:prstDash val="solid"/>
+                      <a:round/>
+                      <a:headEnd type="none" w="med" len="med"/>
+                      <a:tailEnd type="none" w="med" len="med"/>
+                    </a:lnB>
+                  </a:tcPr>
+                </a:tc>
+                <a:tc>
+                  <a:txBody>
+                    <a:bodyPr/>
+                    <a:lstStyle/>
+                    <a:p>
+                      <a:pPr algn="ctr">
+                        <a:spcBef>
+                          <a:spcPts val="300"/>
+                        </a:spcBef>
+                        <a:spcAft>
+                          <a:spcPts val="0"/>
+                        </a:spcAft>
+                      </a:pPr>
+                      <a:r>
+                        <a:rPr lang="pt-BR" sz="3000" b="1" dirty="0" smtClean="0">
+                          <a:solidFill>
+                            <a:srgbClr val="000000"/>
+                          </a:solidFill>
+                          <a:effectLst/>
+                          <a:latin typeface="Arial"/>
+                          <a:ea typeface="Times New Roman"/>
+                        </a:rPr>
+                        <a:t>Proposta</a:t>
+                      </a:r>
+                      <a:endParaRPr lang="en-GB" sz="3000" b="1" dirty="0">
+                        <a:effectLst/>
+                        <a:latin typeface="Times New Roman"/>
+                        <a:ea typeface="SimSun"/>
+                      </a:endParaRPr>
+                    </a:p>
+                  </a:txBody>
+                  <a:tcPr marL="41855" marR="41855" marT="0" marB="0" anchor="ctr">
+                    <a:lnL>
+                      <a:noFill/>
+                    </a:lnL>
+                    <a:lnR>
+                      <a:noFill/>
+                    </a:lnR>
+                    <a:lnT w="38100" cap="flat" cmpd="sng" algn="ctr">
+                      <a:solidFill>
+                        <a:srgbClr val="000000"/>
+                      </a:solidFill>
+                      <a:prstDash val="solid"/>
+                      <a:round/>
+                      <a:headEnd type="none" w="med" len="med"/>
+                      <a:tailEnd type="none" w="med" len="med"/>
+                    </a:lnT>
+                    <a:lnB w="12700" cap="flat" cmpd="sng" algn="ctr">
+                      <a:solidFill>
+                        <a:srgbClr val="000000"/>
+                      </a:solidFill>
+                      <a:prstDash val="solid"/>
+                      <a:round/>
+                      <a:headEnd type="none" w="med" len="med"/>
+                      <a:tailEnd type="none" w="med" len="med"/>
+                    </a:lnB>
+                  </a:tcPr>
+                </a:tc>
+              </a:tr>
+              <a:tr h="1670824">
+                <a:tc>
+                  <a:txBody>
+                    <a:bodyPr/>
+                    <a:lstStyle/>
+                    <a:p>
+                      <a:pPr algn="l">
+                        <a:lnSpc>
+                          <a:spcPct val="115000"/>
+                        </a:lnSpc>
+                        <a:spcBef>
+                          <a:spcPts val="300"/>
+                        </a:spcBef>
+                        <a:spcAft>
+                          <a:spcPts val="0"/>
+                        </a:spcAft>
+                      </a:pPr>
+                      <a:r>
+                        <a:rPr lang="pt-BR" sz="2000" b="1" dirty="0">
+                          <a:solidFill>
+                            <a:srgbClr val="000000"/>
+                          </a:solidFill>
+                          <a:effectLst/>
+                          <a:latin typeface="Arial"/>
+                          <a:ea typeface="Times New Roman"/>
+                        </a:rPr>
+                        <a:t>SP 1.1</a:t>
+                      </a:r>
+                      <a:r>
+                        <a:rPr lang="pt-BR" sz="2000" dirty="0">
+                          <a:solidFill>
+                            <a:srgbClr val="000000"/>
+                          </a:solidFill>
+                          <a:effectLst/>
+                          <a:latin typeface="Arial"/>
+                          <a:ea typeface="Times New Roman"/>
+                        </a:rPr>
+                        <a:t> Avaliar objetivamente processos realizados selecionado contra descrições aplicáveis processo, padrões e procedimentos.</a:t>
+                      </a:r>
+                      <a:endParaRPr lang="en-GB" sz="2000" dirty="0">
+                        <a:effectLst/>
+                        <a:latin typeface="Times New Roman"/>
+                        <a:ea typeface="SimSun"/>
+                      </a:endParaRPr>
+                    </a:p>
+                  </a:txBody>
+                  <a:tcPr marL="41855" marR="41855" marT="0" marB="0" anchor="ctr">
+                    <a:lnL>
+                      <a:noFill/>
+                    </a:lnL>
+                    <a:lnR w="12700" cap="flat" cmpd="sng" algn="ctr">
+                      <a:solidFill>
+                        <a:srgbClr val="000000"/>
+                      </a:solidFill>
+                      <a:prstDash val="solid"/>
+                      <a:round/>
+                      <a:headEnd type="none" w="med" len="med"/>
+                      <a:tailEnd type="none" w="med" len="med"/>
+                    </a:lnR>
+                    <a:lnT w="12700" cap="flat" cmpd="sng" algn="ctr">
+                      <a:solidFill>
+                        <a:srgbClr val="000000"/>
+                      </a:solidFill>
+                      <a:prstDash val="solid"/>
+                      <a:round/>
+                      <a:headEnd type="none" w="med" len="med"/>
+                      <a:tailEnd type="none" w="med" len="med"/>
+                    </a:lnT>
+                    <a:lnB w="12700" cap="flat" cmpd="sng" algn="ctr">
+                      <a:solidFill>
+                        <a:srgbClr val="000000"/>
+                      </a:solidFill>
+                      <a:prstDash val="solid"/>
+                      <a:round/>
+                      <a:headEnd type="none" w="med" len="med"/>
+                      <a:tailEnd type="none" w="med" len="med"/>
+                    </a:lnB>
+                  </a:tcPr>
+                </a:tc>
+                <a:tc>
+                  <a:txBody>
+                    <a:bodyPr/>
+                    <a:lstStyle/>
+                    <a:p>
+                      <a:pPr algn="l">
+                        <a:spcBef>
+                          <a:spcPts val="300"/>
+                        </a:spcBef>
+                        <a:spcAft>
+                          <a:spcPts val="0"/>
+                        </a:spcAft>
+                      </a:pPr>
+                      <a:r>
+                        <a:rPr lang="pt-BR" sz="2000" b="1" dirty="0" smtClean="0">
+                          <a:solidFill>
+                            <a:srgbClr val="000000"/>
+                          </a:solidFill>
+                          <a:effectLst/>
+                          <a:latin typeface="Arial"/>
+                          <a:ea typeface="Arial"/>
+                        </a:rPr>
+                        <a:t>4.</a:t>
+                      </a:r>
+                      <a:r>
+                        <a:rPr lang="pt-BR" sz="2000" b="1" baseline="0" dirty="0" smtClean="0">
+                          <a:solidFill>
+                            <a:srgbClr val="000000"/>
+                          </a:solidFill>
+                          <a:effectLst/>
+                          <a:latin typeface="Arial"/>
+                          <a:ea typeface="Arial"/>
+                        </a:rPr>
+                        <a:t> </a:t>
+                      </a:r>
+                      <a:r>
+                        <a:rPr lang="pt-BR" sz="2000" b="1" dirty="0" smtClean="0">
+                          <a:solidFill>
+                            <a:srgbClr val="000000"/>
+                          </a:solidFill>
+                          <a:effectLst/>
+                          <a:latin typeface="Arial"/>
+                          <a:ea typeface="Arial"/>
+                        </a:rPr>
+                        <a:t>Avaliar </a:t>
+                      </a:r>
+                      <a:r>
+                        <a:rPr lang="pt-BR" sz="2000" b="1" dirty="0">
+                          <a:solidFill>
+                            <a:srgbClr val="000000"/>
+                          </a:solidFill>
+                          <a:effectLst/>
+                          <a:latin typeface="Arial"/>
+                          <a:ea typeface="Arial"/>
+                        </a:rPr>
+                        <a:t>objetivamente os processos.</a:t>
+                      </a:r>
+                      <a:endParaRPr lang="en-GB" sz="2000" b="1" dirty="0">
+                        <a:effectLst/>
+                        <a:latin typeface="Times New Roman"/>
+                        <a:ea typeface="SimSun"/>
+                      </a:endParaRPr>
+                    </a:p>
+                  </a:txBody>
+                  <a:tcPr marL="41855" marR="41855" marT="0" marB="0" anchor="ctr">
+                    <a:lnL w="12700" cap="flat" cmpd="sng" algn="ctr">
+                      <a:solidFill>
+                        <a:srgbClr val="000000"/>
+                      </a:solidFill>
+                      <a:prstDash val="solid"/>
+                      <a:round/>
+                      <a:headEnd type="none" w="med" len="med"/>
+                      <a:tailEnd type="none" w="med" len="med"/>
+                    </a:lnL>
+                    <a:lnR>
+                      <a:noFill/>
+                    </a:lnR>
+                    <a:lnT w="12700" cap="flat" cmpd="sng" algn="ctr">
+                      <a:solidFill>
+                        <a:srgbClr val="000000"/>
+                      </a:solidFill>
+                      <a:prstDash val="solid"/>
+                      <a:round/>
+                      <a:headEnd type="none" w="med" len="med"/>
+                      <a:tailEnd type="none" w="med" len="med"/>
+                    </a:lnT>
+                    <a:lnB w="12700" cap="flat" cmpd="sng" algn="ctr">
+                      <a:solidFill>
+                        <a:srgbClr val="000000"/>
+                      </a:solidFill>
+                      <a:prstDash val="solid"/>
+                      <a:round/>
+                      <a:headEnd type="none" w="med" len="med"/>
+                      <a:tailEnd type="none" w="med" len="med"/>
+                    </a:lnB>
+                  </a:tcPr>
+                </a:tc>
+              </a:tr>
+              <a:tr h="1670824">
+                <a:tc>
+                  <a:txBody>
+                    <a:bodyPr/>
+                    <a:lstStyle/>
+                    <a:p>
+                      <a:pPr algn="l">
+                        <a:lnSpc>
+                          <a:spcPct val="115000"/>
+                        </a:lnSpc>
+                        <a:spcBef>
+                          <a:spcPts val="300"/>
+                        </a:spcBef>
+                        <a:spcAft>
+                          <a:spcPts val="0"/>
+                        </a:spcAft>
+                      </a:pPr>
+                      <a:r>
+                        <a:rPr lang="pt-BR" sz="2000" b="1">
+                          <a:solidFill>
+                            <a:srgbClr val="000000"/>
+                          </a:solidFill>
+                          <a:effectLst/>
+                          <a:latin typeface="Arial"/>
+                          <a:ea typeface="Times New Roman"/>
+                        </a:rPr>
+                        <a:t>SP 1.2</a:t>
+                      </a:r>
+                      <a:r>
+                        <a:rPr lang="pt-BR" sz="2000">
+                          <a:solidFill>
+                            <a:srgbClr val="000000"/>
+                          </a:solidFill>
+                          <a:effectLst/>
+                          <a:latin typeface="Arial"/>
+                          <a:ea typeface="Times New Roman"/>
+                        </a:rPr>
+                        <a:t> Avaliar objetivamente produtos de trabalho selecionado contra as descrições aplicáveis processo, padrões e procedimentos.</a:t>
+                      </a:r>
+                      <a:endParaRPr lang="en-GB" sz="2000">
+                        <a:effectLst/>
+                        <a:latin typeface="Times New Roman"/>
+                        <a:ea typeface="SimSun"/>
+                      </a:endParaRPr>
+                    </a:p>
+                  </a:txBody>
+                  <a:tcPr marL="41855" marR="41855" marT="0" marB="0" anchor="ctr">
+                    <a:lnL>
+                      <a:noFill/>
+                    </a:lnL>
+                    <a:lnR w="12700" cap="flat" cmpd="sng" algn="ctr">
+                      <a:solidFill>
+                        <a:srgbClr val="000000"/>
+                      </a:solidFill>
+                      <a:prstDash val="solid"/>
+                      <a:round/>
+                      <a:headEnd type="none" w="med" len="med"/>
+                      <a:tailEnd type="none" w="med" len="med"/>
+                    </a:lnR>
+                    <a:lnT w="12700" cap="flat" cmpd="sng" algn="ctr">
+                      <a:solidFill>
+                        <a:srgbClr val="000000"/>
+                      </a:solidFill>
+                      <a:prstDash val="solid"/>
+                      <a:round/>
+                      <a:headEnd type="none" w="med" len="med"/>
+                      <a:tailEnd type="none" w="med" len="med"/>
+                    </a:lnT>
+                    <a:lnB w="12700" cap="flat" cmpd="sng" algn="ctr">
+                      <a:solidFill>
+                        <a:srgbClr val="000000"/>
+                      </a:solidFill>
+                      <a:prstDash val="solid"/>
+                      <a:round/>
+                      <a:headEnd type="none" w="med" len="med"/>
+                      <a:tailEnd type="none" w="med" len="med"/>
+                    </a:lnB>
+                  </a:tcPr>
+                </a:tc>
+                <a:tc>
+                  <a:txBody>
+                    <a:bodyPr/>
+                    <a:lstStyle/>
+                    <a:p>
+                      <a:pPr algn="l">
+                        <a:spcBef>
+                          <a:spcPts val="300"/>
+                        </a:spcBef>
+                        <a:spcAft>
+                          <a:spcPts val="0"/>
+                        </a:spcAft>
+                      </a:pPr>
+                      <a:r>
+                        <a:rPr lang="pt-BR" sz="2000" b="1" dirty="0" smtClean="0">
+                          <a:solidFill>
+                            <a:srgbClr val="000000"/>
+                          </a:solidFill>
+                          <a:effectLst/>
+                          <a:latin typeface="Arial"/>
+                          <a:ea typeface="Arial"/>
+                        </a:rPr>
+                        <a:t>3.</a:t>
+                      </a:r>
+                      <a:r>
+                        <a:rPr lang="pt-BR" sz="2000" b="1" baseline="0" dirty="0" smtClean="0">
+                          <a:solidFill>
+                            <a:srgbClr val="000000"/>
+                          </a:solidFill>
+                          <a:effectLst/>
+                          <a:latin typeface="Arial"/>
+                          <a:ea typeface="Arial"/>
+                        </a:rPr>
+                        <a:t> </a:t>
+                      </a:r>
+                      <a:r>
+                        <a:rPr lang="pt-BR" sz="2000" b="1" dirty="0" smtClean="0">
+                          <a:solidFill>
+                            <a:srgbClr val="000000"/>
+                          </a:solidFill>
+                          <a:effectLst/>
+                          <a:latin typeface="Arial"/>
+                          <a:ea typeface="Arial"/>
+                        </a:rPr>
+                        <a:t>Avaliar </a:t>
+                      </a:r>
+                      <a:r>
+                        <a:rPr lang="pt-BR" sz="2000" b="1" dirty="0">
+                          <a:solidFill>
+                            <a:srgbClr val="000000"/>
+                          </a:solidFill>
+                          <a:effectLst/>
+                          <a:latin typeface="Arial"/>
+                          <a:ea typeface="Arial"/>
+                        </a:rPr>
+                        <a:t>objetivamente os produtos de trabalho e serviços.</a:t>
+                      </a:r>
+                      <a:endParaRPr lang="en-GB" sz="2000" b="1" dirty="0">
+                        <a:effectLst/>
+                        <a:latin typeface="Times New Roman"/>
+                        <a:ea typeface="SimSun"/>
+                      </a:endParaRPr>
+                    </a:p>
+                  </a:txBody>
+                  <a:tcPr marL="41855" marR="41855" marT="0" marB="0" anchor="ctr">
+                    <a:lnL w="12700" cap="flat" cmpd="sng" algn="ctr">
+                      <a:solidFill>
+                        <a:srgbClr val="000000"/>
+                      </a:solidFill>
+                      <a:prstDash val="solid"/>
+                      <a:round/>
+                      <a:headEnd type="none" w="med" len="med"/>
+                      <a:tailEnd type="none" w="med" len="med"/>
+                    </a:lnL>
+                    <a:lnR>
+                      <a:noFill/>
+                    </a:lnR>
+                    <a:lnT w="12700" cap="flat" cmpd="sng" algn="ctr">
+                      <a:solidFill>
+                        <a:srgbClr val="000000"/>
+                      </a:solidFill>
+                      <a:prstDash val="solid"/>
+                      <a:round/>
+                      <a:headEnd type="none" w="med" len="med"/>
+                      <a:tailEnd type="none" w="med" len="med"/>
+                    </a:lnT>
+                    <a:lnB w="12700" cap="flat" cmpd="sng" algn="ctr">
+                      <a:solidFill>
+                        <a:srgbClr val="000000"/>
+                      </a:solidFill>
+                      <a:prstDash val="solid"/>
+                      <a:round/>
+                      <a:headEnd type="none" w="med" len="med"/>
+                      <a:tailEnd type="none" w="med" len="med"/>
+                    </a:lnB>
+                  </a:tcPr>
+                </a:tc>
+              </a:tr>
+              <a:tr h="1464028">
+                <a:tc>
+                  <a:txBody>
+                    <a:bodyPr/>
+                    <a:lstStyle/>
+                    <a:p>
+                      <a:pPr algn="l">
+                        <a:lnSpc>
+                          <a:spcPct val="115000"/>
+                        </a:lnSpc>
+                        <a:spcBef>
+                          <a:spcPts val="300"/>
+                        </a:spcBef>
+                        <a:spcAft>
+                          <a:spcPts val="0"/>
+                        </a:spcAft>
+                      </a:pPr>
+                      <a:r>
+                        <a:rPr lang="pt-BR" sz="2000" b="1">
+                          <a:solidFill>
+                            <a:srgbClr val="000000"/>
+                          </a:solidFill>
+                          <a:effectLst/>
+                          <a:latin typeface="Arial"/>
+                          <a:ea typeface="Times New Roman"/>
+                        </a:rPr>
+                        <a:t>SP 2.1</a:t>
+                      </a:r>
+                      <a:r>
+                        <a:rPr lang="pt-BR" sz="2000">
+                          <a:solidFill>
+                            <a:srgbClr val="000000"/>
+                          </a:solidFill>
+                          <a:effectLst/>
+                          <a:latin typeface="Arial"/>
+                          <a:ea typeface="Times New Roman"/>
+                        </a:rPr>
+                        <a:t> Comunicar problemas de qualidade e garantir a resolução dos problemas de não conformidade com a equipe e gestores.</a:t>
+                      </a:r>
+                      <a:endParaRPr lang="en-GB" sz="2000">
+                        <a:effectLst/>
+                        <a:latin typeface="Times New Roman"/>
+                        <a:ea typeface="SimSun"/>
+                      </a:endParaRPr>
+                    </a:p>
+                  </a:txBody>
+                  <a:tcPr marL="41855" marR="41855" marT="0" marB="0" anchor="ctr">
+                    <a:lnL>
+                      <a:noFill/>
+                    </a:lnL>
+                    <a:lnR w="12700" cap="flat" cmpd="sng" algn="ctr">
+                      <a:solidFill>
+                        <a:srgbClr val="000000"/>
+                      </a:solidFill>
+                      <a:prstDash val="solid"/>
+                      <a:round/>
+                      <a:headEnd type="none" w="med" len="med"/>
+                      <a:tailEnd type="none" w="med" len="med"/>
+                    </a:lnR>
+                    <a:lnT w="12700" cap="flat" cmpd="sng" algn="ctr">
+                      <a:solidFill>
+                        <a:srgbClr val="000000"/>
+                      </a:solidFill>
+                      <a:prstDash val="solid"/>
+                      <a:round/>
+                      <a:headEnd type="none" w="med" len="med"/>
+                      <a:tailEnd type="none" w="med" len="med"/>
+                    </a:lnT>
+                    <a:lnB w="12700" cap="flat" cmpd="sng" algn="ctr">
+                      <a:solidFill>
+                        <a:srgbClr val="000000"/>
+                      </a:solidFill>
+                      <a:prstDash val="solid"/>
+                      <a:round/>
+                      <a:headEnd type="none" w="med" len="med"/>
+                      <a:tailEnd type="none" w="med" len="med"/>
+                    </a:lnB>
+                  </a:tcPr>
+                </a:tc>
+                <a:tc>
+                  <a:txBody>
+                    <a:bodyPr/>
+                    <a:lstStyle/>
+                    <a:p>
+                      <a:pPr algn="l">
+                        <a:spcBef>
+                          <a:spcPts val="300"/>
+                        </a:spcBef>
+                        <a:spcAft>
+                          <a:spcPts val="0"/>
+                        </a:spcAft>
+                      </a:pPr>
+                      <a:r>
+                        <a:rPr lang="pt-BR" sz="2000" b="1" dirty="0" smtClean="0">
+                          <a:solidFill>
+                            <a:srgbClr val="000000"/>
+                          </a:solidFill>
+                          <a:effectLst/>
+                          <a:latin typeface="Arial"/>
+                          <a:ea typeface="Arial"/>
+                        </a:rPr>
+                        <a:t>5.</a:t>
+                      </a:r>
+                      <a:r>
+                        <a:rPr lang="pt-BR" sz="2000" b="1" baseline="0" dirty="0" smtClean="0">
+                          <a:solidFill>
+                            <a:srgbClr val="000000"/>
+                          </a:solidFill>
+                          <a:effectLst/>
+                          <a:latin typeface="Arial"/>
+                          <a:ea typeface="Arial"/>
+                        </a:rPr>
+                        <a:t> </a:t>
+                      </a:r>
+                      <a:r>
+                        <a:rPr lang="pt-BR" sz="2000" b="1" dirty="0" smtClean="0">
+                          <a:solidFill>
+                            <a:srgbClr val="000000"/>
+                          </a:solidFill>
+                          <a:effectLst/>
+                          <a:latin typeface="Arial"/>
+                          <a:ea typeface="Arial"/>
+                        </a:rPr>
+                        <a:t>Elaborar </a:t>
+                      </a:r>
+                      <a:r>
+                        <a:rPr lang="pt-BR" sz="2000" b="1" dirty="0">
+                          <a:solidFill>
+                            <a:srgbClr val="000000"/>
+                          </a:solidFill>
+                          <a:effectLst/>
+                          <a:latin typeface="Arial"/>
+                          <a:ea typeface="Arial"/>
+                        </a:rPr>
+                        <a:t>relatório de não conformidades.</a:t>
+                      </a:r>
+                      <a:endParaRPr lang="en-GB" sz="2000" b="1" dirty="0">
+                        <a:effectLst/>
+                        <a:latin typeface="Times New Roman"/>
+                        <a:ea typeface="SimSun"/>
+                      </a:endParaRPr>
+                    </a:p>
+                  </a:txBody>
+                  <a:tcPr marL="41855" marR="41855" marT="0" marB="0" anchor="ctr">
+                    <a:lnL w="12700" cap="flat" cmpd="sng" algn="ctr">
+                      <a:solidFill>
+                        <a:srgbClr val="000000"/>
+                      </a:solidFill>
+                      <a:prstDash val="solid"/>
+                      <a:round/>
+                      <a:headEnd type="none" w="med" len="med"/>
+                      <a:tailEnd type="none" w="med" len="med"/>
+                    </a:lnL>
+                    <a:lnR>
+                      <a:noFill/>
+                    </a:lnR>
+                    <a:lnT w="12700" cap="flat" cmpd="sng" algn="ctr">
+                      <a:solidFill>
+                        <a:srgbClr val="000000"/>
+                      </a:solidFill>
+                      <a:prstDash val="solid"/>
+                      <a:round/>
+                      <a:headEnd type="none" w="med" len="med"/>
+                      <a:tailEnd type="none" w="med" len="med"/>
+                    </a:lnT>
+                    <a:lnB w="12700" cap="flat" cmpd="sng" algn="ctr">
+                      <a:solidFill>
+                        <a:srgbClr val="000000"/>
+                      </a:solidFill>
+                      <a:prstDash val="solid"/>
+                      <a:round/>
+                      <a:headEnd type="none" w="med" len="med"/>
+                      <a:tailEnd type="none" w="med" len="med"/>
+                    </a:lnB>
+                  </a:tcPr>
+                </a:tc>
+              </a:tr>
+              <a:tr h="445566">
+                <a:tc rowSpan="3">
+                  <a:txBody>
+                    <a:bodyPr/>
+                    <a:lstStyle/>
+                    <a:p>
+                      <a:pPr algn="l">
+                        <a:lnSpc>
+                          <a:spcPct val="115000"/>
+                        </a:lnSpc>
+                        <a:spcBef>
+                          <a:spcPts val="300"/>
+                        </a:spcBef>
+                        <a:spcAft>
+                          <a:spcPts val="0"/>
+                        </a:spcAft>
+                      </a:pPr>
+                      <a:r>
+                        <a:rPr lang="pt-BR" sz="2000" b="1">
+                          <a:solidFill>
+                            <a:srgbClr val="000000"/>
+                          </a:solidFill>
+                          <a:effectLst/>
+                          <a:latin typeface="Arial"/>
+                          <a:ea typeface="Times New Roman"/>
+                        </a:rPr>
+                        <a:t>SP 2.2</a:t>
+                      </a:r>
+                      <a:r>
+                        <a:rPr lang="pt-BR" sz="2000">
+                          <a:solidFill>
+                            <a:srgbClr val="000000"/>
+                          </a:solidFill>
+                          <a:effectLst/>
+                          <a:latin typeface="Arial"/>
+                          <a:ea typeface="Times New Roman"/>
+                        </a:rPr>
+                        <a:t> Estabelecer e manter registros das atividades de garantia de qualidade.</a:t>
+                      </a:r>
+                      <a:endParaRPr lang="en-GB" sz="2000">
+                        <a:effectLst/>
+                        <a:latin typeface="Times New Roman"/>
+                        <a:ea typeface="SimSun"/>
+                      </a:endParaRPr>
+                    </a:p>
+                  </a:txBody>
+                  <a:tcPr marL="41855" marR="41855" marT="0" marB="0" anchor="ctr">
+                    <a:lnL>
+                      <a:noFill/>
+                    </a:lnL>
+                    <a:lnR w="12700" cap="flat" cmpd="sng" algn="ctr">
+                      <a:solidFill>
+                        <a:srgbClr val="000000"/>
+                      </a:solidFill>
+                      <a:prstDash val="solid"/>
+                      <a:round/>
+                      <a:headEnd type="none" w="med" len="med"/>
+                      <a:tailEnd type="none" w="med" len="med"/>
+                    </a:lnR>
+                    <a:lnT w="12700" cap="flat" cmpd="sng" algn="ctr">
+                      <a:solidFill>
+                        <a:srgbClr val="000000"/>
+                      </a:solidFill>
+                      <a:prstDash val="solid"/>
+                      <a:round/>
+                      <a:headEnd type="none" w="med" len="med"/>
+                      <a:tailEnd type="none" w="med" len="med"/>
+                    </a:lnT>
+                    <a:lnB w="12700" cap="flat" cmpd="sng" algn="ctr">
+                      <a:solidFill>
+                        <a:srgbClr val="000000"/>
+                      </a:solidFill>
+                      <a:prstDash val="solid"/>
+                      <a:round/>
+                      <a:headEnd type="none" w="med" len="med"/>
+                      <a:tailEnd type="none" w="med" len="med"/>
+                    </a:lnB>
+                  </a:tcPr>
+                </a:tc>
+                <a:tc>
+                  <a:txBody>
+                    <a:bodyPr/>
+                    <a:lstStyle/>
+                    <a:p>
+                      <a:pPr algn="l">
+                        <a:spcBef>
+                          <a:spcPts val="300"/>
+                        </a:spcBef>
+                        <a:spcAft>
+                          <a:spcPts val="0"/>
+                        </a:spcAft>
+                      </a:pPr>
+                      <a:r>
+                        <a:rPr lang="pt-BR" sz="2000" b="1" dirty="0" smtClean="0">
+                          <a:solidFill>
+                            <a:srgbClr val="000000"/>
+                          </a:solidFill>
+                          <a:effectLst/>
+                          <a:latin typeface="Arial"/>
+                          <a:ea typeface="Arial"/>
+                        </a:rPr>
+                        <a:t>2.</a:t>
+                      </a:r>
+                      <a:r>
+                        <a:rPr lang="pt-BR" sz="2000" b="1" baseline="0" dirty="0" smtClean="0">
+                          <a:solidFill>
+                            <a:srgbClr val="000000"/>
+                          </a:solidFill>
+                          <a:effectLst/>
+                          <a:latin typeface="Arial"/>
+                          <a:ea typeface="Arial"/>
+                        </a:rPr>
+                        <a:t> </a:t>
+                      </a:r>
+                      <a:r>
+                        <a:rPr lang="pt-BR" sz="2000" b="1" dirty="0" smtClean="0">
+                          <a:solidFill>
+                            <a:srgbClr val="000000"/>
+                          </a:solidFill>
+                          <a:effectLst/>
+                          <a:latin typeface="Arial"/>
+                          <a:ea typeface="Arial"/>
+                        </a:rPr>
+                        <a:t>Elaborar </a:t>
+                      </a:r>
+                      <a:r>
+                        <a:rPr lang="pt-BR" sz="2000" b="1" dirty="0">
+                          <a:solidFill>
+                            <a:srgbClr val="000000"/>
+                          </a:solidFill>
+                          <a:effectLst/>
+                          <a:latin typeface="Arial"/>
+                          <a:ea typeface="Arial"/>
+                        </a:rPr>
+                        <a:t>plano de qualidade.</a:t>
+                      </a:r>
+                      <a:endParaRPr lang="en-GB" sz="2000" b="1" dirty="0">
+                        <a:effectLst/>
+                        <a:latin typeface="Times New Roman"/>
+                        <a:ea typeface="SimSun"/>
+                      </a:endParaRPr>
+                    </a:p>
+                  </a:txBody>
+                  <a:tcPr marL="41855" marR="41855" marT="0" marB="0" anchor="ctr">
+                    <a:lnL w="12700" cap="flat" cmpd="sng" algn="ctr">
+                      <a:solidFill>
+                        <a:srgbClr val="000000"/>
+                      </a:solidFill>
+                      <a:prstDash val="solid"/>
+                      <a:round/>
+                      <a:headEnd type="none" w="med" len="med"/>
+                      <a:tailEnd type="none" w="med" len="med"/>
+                    </a:lnL>
+                    <a:lnR>
+                      <a:noFill/>
+                    </a:lnR>
+                    <a:lnT w="12700" cap="flat" cmpd="sng" algn="ctr">
+                      <a:solidFill>
+                        <a:srgbClr val="000000"/>
+                      </a:solidFill>
+                      <a:prstDash val="solid"/>
+                      <a:round/>
+                      <a:headEnd type="none" w="med" len="med"/>
+                      <a:tailEnd type="none" w="med" len="med"/>
+                    </a:lnT>
+                    <a:lnB w="12700" cap="flat" cmpd="sng" algn="ctr">
+                      <a:solidFill>
+                        <a:srgbClr val="000000"/>
+                      </a:solidFill>
+                      <a:prstDash val="solid"/>
+                      <a:round/>
+                      <a:headEnd type="none" w="med" len="med"/>
+                      <a:tailEnd type="none" w="med" len="med"/>
+                    </a:lnB>
+                  </a:tcPr>
+                </a:tc>
+              </a:tr>
+              <a:tr h="679683">
+                <a:tc vMerge="1">
+                  <a:txBody>
+                    <a:bodyPr/>
+                    <a:lstStyle/>
+                    <a:p>
+                      <a:endParaRPr lang="en-GB"/>
+                    </a:p>
+                  </a:txBody>
+                  <a:tcPr/>
+                </a:tc>
+                <a:tc>
+                  <a:txBody>
+                    <a:bodyPr/>
+                    <a:lstStyle/>
+                    <a:p>
+                      <a:pPr algn="l">
+                        <a:spcBef>
+                          <a:spcPts val="300"/>
+                        </a:spcBef>
+                        <a:spcAft>
+                          <a:spcPts val="0"/>
+                        </a:spcAft>
+                      </a:pPr>
+                      <a:r>
+                        <a:rPr lang="pt-BR" sz="2000" b="1" dirty="0" smtClean="0">
+                          <a:solidFill>
+                            <a:srgbClr val="000000"/>
+                          </a:solidFill>
+                          <a:effectLst/>
+                          <a:latin typeface="Arial"/>
+                          <a:ea typeface="Arial"/>
+                        </a:rPr>
+                        <a:t>6. Elaborar </a:t>
+                      </a:r>
+                      <a:r>
+                        <a:rPr lang="pt-BR" sz="2000" b="1" dirty="0">
+                          <a:solidFill>
+                            <a:srgbClr val="000000"/>
+                          </a:solidFill>
+                          <a:effectLst/>
+                          <a:latin typeface="Arial"/>
+                          <a:ea typeface="Arial"/>
+                        </a:rPr>
+                        <a:t>relatório periódico de garantia da qualidade.</a:t>
+                      </a:r>
+                      <a:endParaRPr lang="en-GB" sz="2000" b="1" dirty="0">
+                        <a:effectLst/>
+                        <a:latin typeface="Times New Roman"/>
+                        <a:ea typeface="SimSun"/>
+                      </a:endParaRPr>
+                    </a:p>
+                  </a:txBody>
+                  <a:tcPr marL="41855" marR="41855" marT="0" marB="0" anchor="ctr">
+                    <a:lnL w="12700" cap="flat" cmpd="sng" algn="ctr">
+                      <a:solidFill>
+                        <a:srgbClr val="000000"/>
+                      </a:solidFill>
+                      <a:prstDash val="solid"/>
+                      <a:round/>
+                      <a:headEnd type="none" w="med" len="med"/>
+                      <a:tailEnd type="none" w="med" len="med"/>
+                    </a:lnL>
+                    <a:lnR>
+                      <a:noFill/>
+                    </a:lnR>
+                    <a:lnT w="12700" cap="flat" cmpd="sng" algn="ctr">
+                      <a:solidFill>
+                        <a:srgbClr val="000000"/>
+                      </a:solidFill>
+                      <a:prstDash val="solid"/>
+                      <a:round/>
+                      <a:headEnd type="none" w="med" len="med"/>
+                      <a:tailEnd type="none" w="med" len="med"/>
+                    </a:lnT>
+                    <a:lnB w="12700" cap="flat" cmpd="sng" algn="ctr">
+                      <a:solidFill>
+                        <a:srgbClr val="000000"/>
+                      </a:solidFill>
+                      <a:prstDash val="solid"/>
+                      <a:round/>
+                      <a:headEnd type="none" w="med" len="med"/>
+                      <a:tailEnd type="none" w="med" len="med"/>
+                    </a:lnB>
+                  </a:tcPr>
+                </a:tc>
+              </a:tr>
+              <a:tr h="972211">
+                <a:tc vMerge="1">
+                  <a:txBody>
+                    <a:bodyPr/>
+                    <a:lstStyle/>
+                    <a:p>
+                      <a:endParaRPr lang="en-GB"/>
+                    </a:p>
+                  </a:txBody>
+                  <a:tcPr/>
+                </a:tc>
+                <a:tc>
+                  <a:txBody>
+                    <a:bodyPr/>
+                    <a:lstStyle/>
+                    <a:p>
+                      <a:pPr algn="l">
+                        <a:spcBef>
+                          <a:spcPts val="300"/>
+                        </a:spcBef>
+                        <a:spcAft>
+                          <a:spcPts val="0"/>
+                        </a:spcAft>
+                      </a:pPr>
+                      <a:r>
+                        <a:rPr lang="pt-BR" sz="2000" b="1" dirty="0" smtClean="0">
+                          <a:solidFill>
+                            <a:srgbClr val="000000"/>
+                          </a:solidFill>
+                          <a:effectLst/>
+                          <a:latin typeface="Arial"/>
+                          <a:ea typeface="Arial"/>
+                        </a:rPr>
+                        <a:t>8.</a:t>
+                      </a:r>
+                      <a:r>
+                        <a:rPr lang="pt-BR" sz="2000" b="1" baseline="0" dirty="0" smtClean="0">
+                          <a:solidFill>
+                            <a:srgbClr val="000000"/>
+                          </a:solidFill>
+                          <a:effectLst/>
+                          <a:latin typeface="Arial"/>
+                          <a:ea typeface="Arial"/>
+                        </a:rPr>
+                        <a:t> </a:t>
+                      </a:r>
+                      <a:r>
+                        <a:rPr lang="pt-BR" sz="2000" b="1" dirty="0" smtClean="0">
+                          <a:solidFill>
+                            <a:srgbClr val="000000"/>
+                          </a:solidFill>
+                          <a:effectLst/>
+                          <a:latin typeface="Arial"/>
+                          <a:ea typeface="Arial"/>
+                        </a:rPr>
+                        <a:t>Elaborar </a:t>
+                      </a:r>
+                      <a:r>
+                        <a:rPr lang="pt-BR" sz="2000" b="1" dirty="0">
+                          <a:solidFill>
+                            <a:srgbClr val="000000"/>
+                          </a:solidFill>
+                          <a:effectLst/>
+                          <a:latin typeface="Arial"/>
+                          <a:ea typeface="Arial"/>
+                        </a:rPr>
+                        <a:t>relatório de lições aprendidas do projeto.</a:t>
+                      </a:r>
+                      <a:endParaRPr lang="en-GB" sz="2000" b="1" dirty="0">
+                        <a:effectLst/>
+                        <a:latin typeface="Times New Roman"/>
+                        <a:ea typeface="SimSun"/>
+                      </a:endParaRPr>
+                    </a:p>
+                  </a:txBody>
+                  <a:tcPr marL="41855" marR="41855" marT="0" marB="0" anchor="ctr">
+                    <a:lnL w="12700" cap="flat" cmpd="sng" algn="ctr">
+                      <a:solidFill>
+                        <a:srgbClr val="000000"/>
+                      </a:solidFill>
+                      <a:prstDash val="solid"/>
+                      <a:round/>
+                      <a:headEnd type="none" w="med" len="med"/>
+                      <a:tailEnd type="none" w="med" len="med"/>
+                    </a:lnL>
+                    <a:lnR>
+                      <a:noFill/>
+                    </a:lnR>
+                    <a:lnT w="12700" cap="flat" cmpd="sng" algn="ctr">
+                      <a:solidFill>
+                        <a:srgbClr val="000000"/>
+                      </a:solidFill>
+                      <a:prstDash val="solid"/>
+                      <a:round/>
+                      <a:headEnd type="none" w="med" len="med"/>
+                      <a:tailEnd type="none" w="med" len="med"/>
+                    </a:lnT>
+                    <a:lnB w="12700" cap="flat" cmpd="sng" algn="ctr">
+                      <a:solidFill>
+                        <a:srgbClr val="000000"/>
+                      </a:solidFill>
+                      <a:prstDash val="solid"/>
+                      <a:round/>
+                      <a:headEnd type="none" w="med" len="med"/>
+                      <a:tailEnd type="none" w="med" len="med"/>
+                    </a:lnB>
+                  </a:tcPr>
+                </a:tc>
+              </a:tr>
+              <a:tr h="1019525">
+                <a:tc rowSpan="3">
+                  <a:txBody>
+                    <a:bodyPr/>
+                    <a:lstStyle/>
+                    <a:p>
+                      <a:pPr algn="l">
+                        <a:lnSpc>
+                          <a:spcPct val="115000"/>
+                        </a:lnSpc>
+                        <a:spcBef>
+                          <a:spcPts val="300"/>
+                        </a:spcBef>
+                        <a:spcAft>
+                          <a:spcPts val="0"/>
+                        </a:spcAft>
+                      </a:pPr>
+                      <a:r>
+                        <a:rPr lang="pt-BR" sz="2000" i="1" dirty="0">
+                          <a:solidFill>
+                            <a:srgbClr val="000000"/>
+                          </a:solidFill>
+                          <a:effectLst/>
+                          <a:latin typeface="Arial"/>
+                          <a:ea typeface="Times New Roman"/>
+                        </a:rPr>
+                        <a:t>Extra - </a:t>
+                      </a:r>
+                      <a:r>
+                        <a:rPr lang="pt-BR" sz="2000" i="1" dirty="0" smtClean="0">
+                          <a:solidFill>
+                            <a:srgbClr val="000000"/>
+                          </a:solidFill>
+                          <a:effectLst/>
+                          <a:latin typeface="Arial"/>
+                          <a:ea typeface="Times New Roman"/>
+                        </a:rPr>
+                        <a:t>Atividades </a:t>
+                      </a:r>
+                      <a:r>
+                        <a:rPr lang="pt-BR" sz="2000" i="1" dirty="0">
+                          <a:solidFill>
+                            <a:srgbClr val="000000"/>
+                          </a:solidFill>
+                          <a:effectLst/>
+                          <a:latin typeface="Arial"/>
+                          <a:ea typeface="Times New Roman"/>
+                        </a:rPr>
+                        <a:t>de Suporte e Informativas</a:t>
+                      </a:r>
+                      <a:endParaRPr lang="en-GB" sz="2000" dirty="0">
+                        <a:effectLst/>
+                        <a:latin typeface="Times New Roman"/>
+                        <a:ea typeface="SimSun"/>
+                      </a:endParaRPr>
+                    </a:p>
+                  </a:txBody>
+                  <a:tcPr marL="41855" marR="41855" marT="0" marB="0" anchor="ctr">
+                    <a:lnL>
+                      <a:noFill/>
+                    </a:lnL>
+                    <a:lnR w="12700" cap="flat" cmpd="sng" algn="ctr">
+                      <a:solidFill>
+                        <a:srgbClr val="000000"/>
+                      </a:solidFill>
+                      <a:prstDash val="solid"/>
+                      <a:round/>
+                      <a:headEnd type="none" w="med" len="med"/>
+                      <a:tailEnd type="none" w="med" len="med"/>
+                    </a:lnR>
+                    <a:lnT w="12700" cap="flat" cmpd="sng" algn="ctr">
+                      <a:solidFill>
+                        <a:srgbClr val="000000"/>
+                      </a:solidFill>
+                      <a:prstDash val="solid"/>
+                      <a:round/>
+                      <a:headEnd type="none" w="med" len="med"/>
+                      <a:tailEnd type="none" w="med" len="med"/>
+                    </a:lnT>
+                    <a:lnB w="28575" cap="flat" cmpd="sng" algn="ctr">
+                      <a:solidFill>
+                        <a:srgbClr val="000000"/>
+                      </a:solidFill>
+                      <a:prstDash val="solid"/>
+                      <a:round/>
+                      <a:headEnd type="none" w="med" len="med"/>
+                      <a:tailEnd type="none" w="med" len="med"/>
+                    </a:lnB>
+                  </a:tcPr>
+                </a:tc>
+                <a:tc>
+                  <a:txBody>
+                    <a:bodyPr/>
+                    <a:lstStyle/>
+                    <a:p>
+                      <a:pPr algn="l">
+                        <a:spcBef>
+                          <a:spcPts val="300"/>
+                        </a:spcBef>
+                        <a:spcAft>
+                          <a:spcPts val="0"/>
+                        </a:spcAft>
+                      </a:pPr>
+                      <a:r>
+                        <a:rPr lang="pt-BR" sz="2000" b="1" dirty="0">
+                          <a:solidFill>
+                            <a:srgbClr val="000000"/>
+                          </a:solidFill>
+                          <a:effectLst/>
+                          <a:latin typeface="Arial"/>
+                          <a:ea typeface="Arial"/>
+                        </a:rPr>
+                        <a:t>1. </a:t>
+                      </a:r>
+                      <a:r>
+                        <a:rPr lang="pt-BR" sz="2000" b="1" dirty="0" smtClean="0">
+                          <a:solidFill>
+                            <a:srgbClr val="000000"/>
+                          </a:solidFill>
+                          <a:effectLst/>
+                          <a:latin typeface="Arial"/>
+                          <a:ea typeface="Arial"/>
+                        </a:rPr>
+                        <a:t>Disponibilizar </a:t>
+                      </a:r>
+                      <a:r>
+                        <a:rPr lang="pt-BR" sz="2000" b="1" dirty="0">
+                          <a:solidFill>
+                            <a:srgbClr val="000000"/>
+                          </a:solidFill>
+                          <a:effectLst/>
+                          <a:latin typeface="Arial"/>
+                          <a:ea typeface="Arial"/>
+                        </a:rPr>
+                        <a:t>materiais de treinamento para os integrantes do projeto.</a:t>
+                      </a:r>
+                      <a:endParaRPr lang="en-GB" sz="2000" b="1" dirty="0">
+                        <a:effectLst/>
+                        <a:latin typeface="Times New Roman"/>
+                        <a:ea typeface="SimSun"/>
+                      </a:endParaRPr>
+                    </a:p>
+                  </a:txBody>
+                  <a:tcPr marL="41855" marR="41855" marT="0" marB="0" anchor="ctr">
+                    <a:lnL w="12700" cap="flat" cmpd="sng" algn="ctr">
+                      <a:solidFill>
+                        <a:srgbClr val="000000"/>
+                      </a:solidFill>
+                      <a:prstDash val="solid"/>
+                      <a:round/>
+                      <a:headEnd type="none" w="med" len="med"/>
+                      <a:tailEnd type="none" w="med" len="med"/>
+                    </a:lnL>
+                    <a:lnR>
+                      <a:noFill/>
+                    </a:lnR>
+                    <a:lnT w="12700" cap="flat" cmpd="sng" algn="ctr">
+                      <a:solidFill>
+                        <a:srgbClr val="000000"/>
+                      </a:solidFill>
+                      <a:prstDash val="solid"/>
+                      <a:round/>
+                      <a:headEnd type="none" w="med" len="med"/>
+                      <a:tailEnd type="none" w="med" len="med"/>
+                    </a:lnT>
+                    <a:lnB w="12700" cap="flat" cmpd="sng" algn="ctr">
+                      <a:solidFill>
+                        <a:srgbClr val="000000"/>
+                      </a:solidFill>
+                      <a:prstDash val="solid"/>
+                      <a:round/>
+                      <a:headEnd type="none" w="med" len="med"/>
+                      <a:tailEnd type="none" w="med" len="med"/>
+                    </a:lnB>
+                  </a:tcPr>
+                </a:tc>
+              </a:tr>
+              <a:tr h="677517">
+                <a:tc vMerge="1">
+                  <a:txBody>
+                    <a:bodyPr/>
+                    <a:lstStyle/>
+                    <a:p>
+                      <a:endParaRPr lang="en-GB"/>
+                    </a:p>
+                  </a:txBody>
+                  <a:tcPr/>
+                </a:tc>
+                <a:tc>
+                  <a:txBody>
+                    <a:bodyPr/>
+                    <a:lstStyle/>
+                    <a:p>
+                      <a:pPr algn="l">
+                        <a:spcBef>
+                          <a:spcPts val="300"/>
+                        </a:spcBef>
+                        <a:spcAft>
+                          <a:spcPts val="0"/>
+                        </a:spcAft>
+                      </a:pPr>
+                      <a:r>
+                        <a:rPr lang="pt-BR" sz="2000" b="1" dirty="0">
+                          <a:solidFill>
+                            <a:srgbClr val="000000"/>
+                          </a:solidFill>
+                          <a:effectLst/>
+                          <a:latin typeface="Arial"/>
+                          <a:ea typeface="Arial"/>
+                        </a:rPr>
+                        <a:t>7. </a:t>
+                      </a:r>
+                      <a:r>
+                        <a:rPr lang="pt-BR" sz="2000" b="1" dirty="0" smtClean="0">
+                          <a:solidFill>
+                            <a:srgbClr val="000000"/>
+                          </a:solidFill>
+                          <a:effectLst/>
+                          <a:latin typeface="Arial"/>
+                          <a:ea typeface="Arial"/>
+                        </a:rPr>
+                        <a:t>Aprovar </a:t>
+                      </a:r>
+                      <a:r>
+                        <a:rPr lang="pt-BR" sz="2000" b="1" dirty="0">
+                          <a:solidFill>
+                            <a:srgbClr val="000000"/>
+                          </a:solidFill>
+                          <a:effectLst/>
+                          <a:latin typeface="Arial"/>
+                          <a:ea typeface="Arial"/>
+                        </a:rPr>
+                        <a:t>produto final para entrega.</a:t>
+                      </a:r>
+                      <a:endParaRPr lang="en-GB" sz="2000" b="1" dirty="0">
+                        <a:effectLst/>
+                        <a:latin typeface="Times New Roman"/>
+                        <a:ea typeface="SimSun"/>
+                      </a:endParaRPr>
+                    </a:p>
+                  </a:txBody>
+                  <a:tcPr marL="41855" marR="41855" marT="0" marB="0" anchor="ctr">
+                    <a:lnL w="12700" cap="flat" cmpd="sng" algn="ctr">
+                      <a:solidFill>
+                        <a:srgbClr val="000000"/>
+                      </a:solidFill>
+                      <a:prstDash val="solid"/>
+                      <a:round/>
+                      <a:headEnd type="none" w="med" len="med"/>
+                      <a:tailEnd type="none" w="med" len="med"/>
+                    </a:lnL>
+                    <a:lnR>
+                      <a:noFill/>
+                    </a:lnR>
+                    <a:lnT w="12700" cap="flat" cmpd="sng" algn="ctr">
+                      <a:solidFill>
+                        <a:srgbClr val="000000"/>
+                      </a:solidFill>
+                      <a:prstDash val="solid"/>
+                      <a:round/>
+                      <a:headEnd type="none" w="med" len="med"/>
+                      <a:tailEnd type="none" w="med" len="med"/>
+                    </a:lnT>
+                    <a:lnB w="12700" cap="flat" cmpd="sng" algn="ctr">
+                      <a:solidFill>
+                        <a:srgbClr val="000000"/>
+                      </a:solidFill>
+                      <a:prstDash val="solid"/>
+                      <a:round/>
+                      <a:headEnd type="none" w="med" len="med"/>
+                      <a:tailEnd type="none" w="med" len="med"/>
+                    </a:lnB>
+                  </a:tcPr>
+                </a:tc>
+              </a:tr>
+              <a:tr h="557633">
+                <a:tc vMerge="1">
+                  <a:txBody>
+                    <a:bodyPr/>
+                    <a:lstStyle/>
+                    <a:p>
+                      <a:endParaRPr lang="en-GB"/>
+                    </a:p>
+                  </a:txBody>
+                  <a:tcPr/>
+                </a:tc>
+                <a:tc>
+                  <a:txBody>
+                    <a:bodyPr/>
+                    <a:lstStyle/>
+                    <a:p>
+                      <a:pPr algn="l">
+                        <a:spcBef>
+                          <a:spcPts val="300"/>
+                        </a:spcBef>
+                        <a:spcAft>
+                          <a:spcPts val="0"/>
+                        </a:spcAft>
+                      </a:pPr>
+                      <a:r>
+                        <a:rPr lang="pt-BR" sz="2000" b="1" dirty="0">
+                          <a:solidFill>
+                            <a:srgbClr val="000000"/>
+                          </a:solidFill>
+                          <a:effectLst/>
+                          <a:latin typeface="Arial"/>
+                          <a:ea typeface="Arial"/>
+                        </a:rPr>
+                        <a:t>9. </a:t>
+                      </a:r>
+                      <a:r>
+                        <a:rPr lang="pt-BR" sz="2000" b="1" dirty="0" smtClean="0">
+                          <a:solidFill>
+                            <a:srgbClr val="000000"/>
+                          </a:solidFill>
+                          <a:effectLst/>
+                          <a:latin typeface="Arial"/>
+                          <a:ea typeface="Arial"/>
+                        </a:rPr>
+                        <a:t>Prestar </a:t>
+                      </a:r>
+                      <a:r>
+                        <a:rPr lang="pt-BR" sz="2000" b="1" dirty="0">
+                          <a:solidFill>
+                            <a:srgbClr val="000000"/>
+                          </a:solidFill>
+                          <a:effectLst/>
+                          <a:latin typeface="Arial"/>
+                          <a:ea typeface="Arial"/>
+                        </a:rPr>
+                        <a:t>suporte a todos os envolvidos no projeto.</a:t>
+                      </a:r>
+                      <a:endParaRPr lang="en-GB" sz="2000" b="1" dirty="0">
+                        <a:effectLst/>
+                        <a:latin typeface="Times New Roman"/>
+                        <a:ea typeface="SimSun"/>
+                      </a:endParaRPr>
+                    </a:p>
+                  </a:txBody>
+                  <a:tcPr marL="41855" marR="41855" marT="0" marB="0" anchor="ctr">
+                    <a:lnL w="12700" cap="flat" cmpd="sng" algn="ctr">
+                      <a:solidFill>
+                        <a:srgbClr val="000000"/>
+                      </a:solidFill>
+                      <a:prstDash val="solid"/>
+                      <a:round/>
+                      <a:headEnd type="none" w="med" len="med"/>
+                      <a:tailEnd type="none" w="med" len="med"/>
+                    </a:lnL>
+                    <a:lnR>
+                      <a:noFill/>
+                    </a:lnR>
+                    <a:lnT w="12700" cap="flat" cmpd="sng" algn="ctr">
+                      <a:solidFill>
+                        <a:srgbClr val="000000"/>
+                      </a:solidFill>
+                      <a:prstDash val="solid"/>
+                      <a:round/>
+                      <a:headEnd type="none" w="med" len="med"/>
+                      <a:tailEnd type="none" w="med" len="med"/>
+                    </a:lnT>
+                    <a:lnB w="28575" cap="flat" cmpd="sng" algn="ctr">
+                      <a:solidFill>
+                        <a:srgbClr val="000000"/>
+                      </a:solidFill>
+                      <a:prstDash val="solid"/>
+                      <a:round/>
+                      <a:headEnd type="none" w="med" len="med"/>
+                      <a:tailEnd type="none" w="med" len="med"/>
+                    </a:lnB>
+                  </a:tcPr>
+                </a:tc>
+              </a:tr>
+            </a:tbl>
+          </a:graphicData>
+        </a:graphic>
+      </p:graphicFrame>
       <p:pic>
         <p:nvPicPr>
-          <p:cNvPr id="42" name="Imagem 41" descr="logo2.png"/>
+          <p:cNvPr id="2" name="Picture 1"/>
           <p:cNvPicPr>
             <a:picLocks noChangeAspect="1"/>
           </p:cNvPicPr>
           <p:nvPr/>
         </p:nvPicPr>
         <p:blipFill>
-          <a:blip r:embed="rId2" cstate="print"/>
+          <a:blip r:embed="rId2" cstate="print">
+            <a:extLst>
+              <a:ext uri="{28A0092B-C50C-407E-A947-70E740481C1C}">
+                <a14:useLocalDpi xmlns:a14="http://schemas.microsoft.com/office/drawing/2010/main" val="0"/>
+              </a:ext>
+            </a:extLst>
+          </a:blip>
           <a:stretch>
             <a:fillRect/>
           </a:stretch>
         </p:blipFill>
         <p:spPr>
           <a:xfrm>
-            <a:off x="2304481" y="4697877"/>
-            <a:ext cx="3888432" cy="2431165"/>
+            <a:off x="2304481" y="4426108"/>
+            <a:ext cx="4176464" cy="2611251"/>
           </a:xfrm>
           <a:prstGeom prst="rect">
             <a:avLst/>

</xml_diff>